<commit_message>
Add slide on lane guiding control
</commit_message>
<xml_diff>
--- a/Praese/Presentation1.pptx
+++ b/Praese/Presentation1.pptx
@@ -5,10 +5,10 @@
     <p:sldMasterId id="2147483648" r:id="rId1"/>
   </p:sldMasterIdLst>
   <p:notesMasterIdLst>
-    <p:notesMasterId r:id="rId30"/>
+    <p:notesMasterId r:id="rId31"/>
   </p:notesMasterIdLst>
   <p:handoutMasterIdLst>
-    <p:handoutMasterId r:id="rId31"/>
+    <p:handoutMasterId r:id="rId32"/>
   </p:handoutMasterIdLst>
   <p:sldIdLst>
     <p:sldId id="256" r:id="rId2"/>
@@ -16,29 +16,30 @@
     <p:sldId id="281" r:id="rId4"/>
     <p:sldId id="283" r:id="rId5"/>
     <p:sldId id="284" r:id="rId6"/>
-    <p:sldId id="258" r:id="rId7"/>
-    <p:sldId id="265" r:id="rId8"/>
-    <p:sldId id="278" r:id="rId9"/>
-    <p:sldId id="257" r:id="rId10"/>
-    <p:sldId id="262" r:id="rId11"/>
-    <p:sldId id="263" r:id="rId12"/>
-    <p:sldId id="273" r:id="rId13"/>
-    <p:sldId id="266" r:id="rId14"/>
-    <p:sldId id="267" r:id="rId15"/>
-    <p:sldId id="268" r:id="rId16"/>
-    <p:sldId id="269" r:id="rId17"/>
-    <p:sldId id="270" r:id="rId18"/>
-    <p:sldId id="271" r:id="rId19"/>
-    <p:sldId id="272" r:id="rId20"/>
-    <p:sldId id="274" r:id="rId21"/>
-    <p:sldId id="279" r:id="rId22"/>
-    <p:sldId id="280" r:id="rId23"/>
-    <p:sldId id="275" r:id="rId24"/>
-    <p:sldId id="276" r:id="rId25"/>
-    <p:sldId id="277" r:id="rId26"/>
-    <p:sldId id="259" r:id="rId27"/>
-    <p:sldId id="260" r:id="rId28"/>
-    <p:sldId id="261" r:id="rId29"/>
+    <p:sldId id="285" r:id="rId7"/>
+    <p:sldId id="258" r:id="rId8"/>
+    <p:sldId id="265" r:id="rId9"/>
+    <p:sldId id="278" r:id="rId10"/>
+    <p:sldId id="257" r:id="rId11"/>
+    <p:sldId id="262" r:id="rId12"/>
+    <p:sldId id="263" r:id="rId13"/>
+    <p:sldId id="273" r:id="rId14"/>
+    <p:sldId id="266" r:id="rId15"/>
+    <p:sldId id="267" r:id="rId16"/>
+    <p:sldId id="268" r:id="rId17"/>
+    <p:sldId id="269" r:id="rId18"/>
+    <p:sldId id="270" r:id="rId19"/>
+    <p:sldId id="271" r:id="rId20"/>
+    <p:sldId id="272" r:id="rId21"/>
+    <p:sldId id="274" r:id="rId22"/>
+    <p:sldId id="279" r:id="rId23"/>
+    <p:sldId id="280" r:id="rId24"/>
+    <p:sldId id="275" r:id="rId25"/>
+    <p:sldId id="276" r:id="rId26"/>
+    <p:sldId id="277" r:id="rId27"/>
+    <p:sldId id="259" r:id="rId28"/>
+    <p:sldId id="260" r:id="rId29"/>
+    <p:sldId id="261" r:id="rId30"/>
   </p:sldIdLst>
   <p:sldSz cx="9144000" cy="6858000" type="screen4x3"/>
   <p:notesSz cx="6858000" cy="9144000"/>
@@ -151,6 +152,7 @@
             <p14:sldId id="281"/>
             <p14:sldId id="283"/>
             <p14:sldId id="284"/>
+            <p14:sldId id="285"/>
           </p14:sldIdLst>
         </p14:section>
         <p14:section name="Pipeline" id="{B99B7CF2-6C8D-9341-8F9D-4A9BBFE13145}">
@@ -883,7 +885,7 @@
           <a:p>
             <a:fld id="{2ADEDB94-756D-ED4B-814C-B4E518AF2B8F}" type="slidenum">
               <a:rPr lang="en-US" smtClean="0"/>
-              <a:t>10</a:t>
+              <a:t>11</a:t>
             </a:fld>
             <a:endParaRPr lang="en-US"/>
           </a:p>
@@ -986,7 +988,7 @@
           <a:p>
             <a:fld id="{2ADEDB94-756D-ED4B-814C-B4E518AF2B8F}" type="slidenum">
               <a:rPr lang="en-US" smtClean="0"/>
-              <a:t>11</a:t>
+              <a:t>12</a:t>
             </a:fld>
             <a:endParaRPr lang="en-US"/>
           </a:p>
@@ -1089,7 +1091,7 @@
           <a:p>
             <a:fld id="{2ADEDB94-756D-ED4B-814C-B4E518AF2B8F}" type="slidenum">
               <a:rPr lang="en-US" smtClean="0"/>
-              <a:t>12</a:t>
+              <a:t>13</a:t>
             </a:fld>
             <a:endParaRPr lang="en-US"/>
           </a:p>
@@ -1192,7 +1194,7 @@
           <a:p>
             <a:fld id="{2ADEDB94-756D-ED4B-814C-B4E518AF2B8F}" type="slidenum">
               <a:rPr lang="en-US" smtClean="0"/>
-              <a:t>13</a:t>
+              <a:t>14</a:t>
             </a:fld>
             <a:endParaRPr lang="en-US"/>
           </a:p>
@@ -1295,7 +1297,7 @@
           <a:p>
             <a:fld id="{2ADEDB94-756D-ED4B-814C-B4E518AF2B8F}" type="slidenum">
               <a:rPr lang="en-US" smtClean="0"/>
-              <a:t>14</a:t>
+              <a:t>15</a:t>
             </a:fld>
             <a:endParaRPr lang="en-US"/>
           </a:p>
@@ -4558,6 +4560,48 @@
       </p:grpSpPr>
       <p:sp>
         <p:nvSpPr>
+          <p:cNvPr id="7" name="Right Arrow 6"/>
+          <p:cNvSpPr/>
+          <p:nvPr/>
+        </p:nvSpPr>
+        <p:spPr>
+          <a:xfrm>
+            <a:off x="3242793" y="4080012"/>
+            <a:ext cx="1718317" cy="851129"/>
+          </a:xfrm>
+          <a:prstGeom prst="rightArrow">
+            <a:avLst/>
+          </a:prstGeom>
+        </p:spPr>
+        <p:style>
+          <a:lnRef idx="2">
+            <a:schemeClr val="dk1">
+              <a:shade val="50000"/>
+            </a:schemeClr>
+          </a:lnRef>
+          <a:fillRef idx="1">
+            <a:schemeClr val="dk1"/>
+          </a:fillRef>
+          <a:effectRef idx="0">
+            <a:schemeClr val="dk1"/>
+          </a:effectRef>
+          <a:fontRef idx="minor">
+            <a:schemeClr val="lt1"/>
+          </a:fontRef>
+        </p:style>
+        <p:txBody>
+          <a:bodyPr rtlCol="0" anchor="ctr"/>
+          <a:lstStyle/>
+          <a:p>
+            <a:pPr algn="ctr"/>
+            <a:endParaRPr lang="en-US" dirty="0">
+              <a:latin typeface="HelveticaNeueLT Com 45 Lt"/>
+            </a:endParaRPr>
+          </a:p>
+        </p:txBody>
+      </p:sp>
+      <p:sp>
+        <p:nvSpPr>
           <p:cNvPr id="2" name="Title 1"/>
           <p:cNvSpPr>
             <a:spLocks noGrp="1"/>
@@ -4569,6 +4613,195 @@
         <p:spPr/>
         <p:txBody>
           <a:bodyPr>
+            <a:normAutofit/>
+          </a:bodyPr>
+          <a:lstStyle/>
+          <a:p>
+            <a:r>
+              <a:rPr lang="en-US" dirty="0" smtClean="0"/>
+              <a:t>Single Instruction - Multiple Data</a:t>
+            </a:r>
+            <a:endParaRPr lang="en-US" sz="2800" dirty="0"/>
+          </a:p>
+        </p:txBody>
+      </p:sp>
+      <p:sp>
+        <p:nvSpPr>
+          <p:cNvPr id="3" name="Content Placeholder 2"/>
+          <p:cNvSpPr>
+            <a:spLocks noGrp="1"/>
+          </p:cNvSpPr>
+          <p:nvPr>
+            <p:ph idx="1"/>
+          </p:nvPr>
+        </p:nvSpPr>
+        <p:spPr>
+          <a:xfrm>
+            <a:off x="457200" y="1397551"/>
+            <a:ext cx="8229600" cy="1358484"/>
+          </a:xfrm>
+        </p:spPr>
+        <p:txBody>
+          <a:bodyPr>
+            <a:normAutofit fontScale="92500"/>
+          </a:bodyPr>
+          <a:lstStyle/>
+          <a:p>
+            <a:r>
+              <a:rPr lang="en-US" dirty="0" smtClean="0"/>
+              <a:t>Exploits </a:t>
+            </a:r>
+            <a:r>
+              <a:rPr lang="en-US" dirty="0"/>
+              <a:t>d</a:t>
+            </a:r>
+            <a:r>
+              <a:rPr lang="en-US" dirty="0" smtClean="0"/>
+              <a:t>ata-level parallelism</a:t>
+            </a:r>
+          </a:p>
+          <a:p>
+            <a:pPr lvl="1"/>
+            <a:r>
+              <a:rPr lang="en-US" dirty="0" smtClean="0"/>
+              <a:t>Operations repeatedly applied to independent data</a:t>
+            </a:r>
+          </a:p>
+        </p:txBody>
+      </p:sp>
+      <p:sp>
+        <p:nvSpPr>
+          <p:cNvPr id="6" name="Slide Number Placeholder 5"/>
+          <p:cNvSpPr>
+            <a:spLocks noGrp="1"/>
+          </p:cNvSpPr>
+          <p:nvPr>
+            <p:ph type="sldNum" sz="quarter" idx="12"/>
+          </p:nvPr>
+        </p:nvSpPr>
+        <p:spPr/>
+        <p:txBody>
+          <a:bodyPr/>
+          <a:lstStyle/>
+          <a:p>
+            <a:fld id="{0A3E316F-3D65-2744-BC5B-55B8D60FFFDF}" type="slidenum">
+              <a:rPr lang="en-US" smtClean="0"/>
+              <a:t>10</a:t>
+            </a:fld>
+            <a:endParaRPr lang="en-US"/>
+          </a:p>
+        </p:txBody>
+      </p:sp>
+      <p:pic>
+        <p:nvPicPr>
+          <p:cNvPr id="4" name="Picture 3" descr="cat.jpg"/>
+          <p:cNvPicPr>
+            <a:picLocks noChangeAspect="1"/>
+          </p:cNvPicPr>
+          <p:nvPr/>
+        </p:nvPicPr>
+        <p:blipFill>
+          <a:blip r:embed="rId2">
+            <a:extLst>
+              <a:ext uri="{28A0092B-C50C-407E-A947-70E740481C1C}">
+                <a14:useLocalDpi xmlns:a14="http://schemas.microsoft.com/office/drawing/2010/main" val="0"/>
+              </a:ext>
+            </a:extLst>
+          </a:blip>
+          <a:stretch>
+            <a:fillRect/>
+          </a:stretch>
+        </p:blipFill>
+        <p:spPr>
+          <a:xfrm>
+            <a:off x="349109" y="3131587"/>
+            <a:ext cx="3804440" cy="2853330"/>
+          </a:xfrm>
+          <a:prstGeom prst="rect">
+            <a:avLst/>
+          </a:prstGeom>
+        </p:spPr>
+      </p:pic>
+      <p:pic>
+        <p:nvPicPr>
+          <p:cNvPr id="5" name="Picture 4" descr="cat-grey.jpg"/>
+          <p:cNvPicPr>
+            <a:picLocks noChangeAspect="1"/>
+          </p:cNvPicPr>
+          <p:nvPr/>
+        </p:nvPicPr>
+        <p:blipFill>
+          <a:blip r:embed="rId3">
+            <a:extLst>
+              <a:ext uri="{28A0092B-C50C-407E-A947-70E740481C1C}">
+                <a14:useLocalDpi xmlns:a14="http://schemas.microsoft.com/office/drawing/2010/main" val="0"/>
+              </a:ext>
+            </a:extLst>
+          </a:blip>
+          <a:stretch>
+            <a:fillRect/>
+          </a:stretch>
+        </p:blipFill>
+        <p:spPr>
+          <a:xfrm>
+            <a:off x="4972282" y="3131586"/>
+            <a:ext cx="3804441" cy="2853331"/>
+          </a:xfrm>
+          <a:prstGeom prst="rect">
+            <a:avLst/>
+          </a:prstGeom>
+        </p:spPr>
+      </p:pic>
+    </p:spTree>
+    <p:extLst>
+      <p:ext uri="{BB962C8B-B14F-4D97-AF65-F5344CB8AC3E}">
+        <p14:creationId xmlns:p14="http://schemas.microsoft.com/office/powerpoint/2010/main" val="661692733"/>
+      </p:ext>
+    </p:extLst>
+  </p:cSld>
+  <p:clrMapOvr>
+    <a:masterClrMapping/>
+  </p:clrMapOvr>
+  <p:timing>
+    <p:tnLst>
+      <p:par>
+        <p:cTn xmlns:p14="http://schemas.microsoft.com/office/powerpoint/2010/main" id="1" dur="indefinite" restart="never" nodeType="tmRoot"/>
+      </p:par>
+    </p:tnLst>
+  </p:timing>
+</p:sld>
+</file>
+
+<file path=ppt/slides/slide11.xml><?xml version="1.0" encoding="utf-8"?>
+<p:sld xmlns:a="http://schemas.openxmlformats.org/drawingml/2006/main" xmlns:r="http://schemas.openxmlformats.org/officeDocument/2006/relationships" xmlns:p="http://schemas.openxmlformats.org/presentationml/2006/main">
+  <p:cSld>
+    <p:spTree>
+      <p:nvGrpSpPr>
+        <p:cNvPr id="1" name=""/>
+        <p:cNvGrpSpPr/>
+        <p:nvPr/>
+      </p:nvGrpSpPr>
+      <p:grpSpPr>
+        <a:xfrm>
+          <a:off x="0" y="0"/>
+          <a:ext cx="0" cy="0"/>
+          <a:chOff x="0" y="0"/>
+          <a:chExt cx="0" cy="0"/>
+        </a:xfrm>
+      </p:grpSpPr>
+      <p:sp>
+        <p:nvSpPr>
+          <p:cNvPr id="2" name="Title 1"/>
+          <p:cNvSpPr>
+            <a:spLocks noGrp="1"/>
+          </p:cNvSpPr>
+          <p:nvPr>
+            <p:ph type="title"/>
+          </p:nvPr>
+        </p:nvSpPr>
+        <p:spPr/>
+        <p:txBody>
+          <a:bodyPr>
             <a:normAutofit fontScale="90000"/>
           </a:bodyPr>
           <a:lstStyle/>
@@ -4627,7 +4860,7 @@
           <a:p>
             <a:fld id="{0A3E316F-3D65-2744-BC5B-55B8D60FFFDF}" type="slidenum">
               <a:rPr lang="en-US" smtClean="0"/>
-              <a:t>10</a:t>
+              <a:t>11</a:t>
             </a:fld>
             <a:endParaRPr lang="en-US"/>
           </a:p>
@@ -4683,7 +4916,7 @@
 </p:sld>
 </file>
 
-<file path=ppt/slides/slide11.xml><?xml version="1.0" encoding="utf-8"?>
+<file path=ppt/slides/slide12.xml><?xml version="1.0" encoding="utf-8"?>
 <p:sld xmlns:a="http://schemas.openxmlformats.org/drawingml/2006/main" xmlns:r="http://schemas.openxmlformats.org/officeDocument/2006/relationships" xmlns:p="http://schemas.openxmlformats.org/presentationml/2006/main">
   <p:cSld>
     <p:spTree>
@@ -4771,7 +5004,7 @@
           <a:p>
             <a:fld id="{0A3E316F-3D65-2744-BC5B-55B8D60FFFDF}" type="slidenum">
               <a:rPr lang="en-US" smtClean="0"/>
-              <a:t>11</a:t>
+              <a:t>12</a:t>
             </a:fld>
             <a:endParaRPr lang="en-US"/>
           </a:p>
@@ -5567,7 +5800,7 @@
 </p:sld>
 </file>
 
-<file path=ppt/slides/slide12.xml><?xml version="1.0" encoding="utf-8"?>
+<file path=ppt/slides/slide13.xml><?xml version="1.0" encoding="utf-8"?>
 <p:sld xmlns:a="http://schemas.openxmlformats.org/drawingml/2006/main" xmlns:r="http://schemas.openxmlformats.org/officeDocument/2006/relationships" xmlns:p="http://schemas.openxmlformats.org/presentationml/2006/main">
   <p:cSld>
     <p:spTree>
@@ -5655,7 +5888,7 @@
           <a:p>
             <a:fld id="{0A3E316F-3D65-2744-BC5B-55B8D60FFFDF}" type="slidenum">
               <a:rPr lang="en-US" smtClean="0"/>
-              <a:t>12</a:t>
+              <a:t>13</a:t>
             </a:fld>
             <a:endParaRPr lang="en-US"/>
           </a:p>
@@ -6499,7 +6732,7 @@
 </p:sld>
 </file>
 
-<file path=ppt/slides/slide13.xml><?xml version="1.0" encoding="utf-8"?>
+<file path=ppt/slides/slide14.xml><?xml version="1.0" encoding="utf-8"?>
 <p:sld xmlns:a="http://schemas.openxmlformats.org/drawingml/2006/main" xmlns:r="http://schemas.openxmlformats.org/officeDocument/2006/relationships" xmlns:p="http://schemas.openxmlformats.org/presentationml/2006/main">
   <p:cSld>
     <p:spTree>
@@ -6587,7 +6820,7 @@
           <a:p>
             <a:fld id="{0A3E316F-3D65-2744-BC5B-55B8D60FFFDF}" type="slidenum">
               <a:rPr lang="en-US" smtClean="0"/>
-              <a:t>13</a:t>
+              <a:t>14</a:t>
             </a:fld>
             <a:endParaRPr lang="en-US"/>
           </a:p>
@@ -7431,7 +7664,7 @@
 </p:sld>
 </file>
 
-<file path=ppt/slides/slide14.xml><?xml version="1.0" encoding="utf-8"?>
+<file path=ppt/slides/slide15.xml><?xml version="1.0" encoding="utf-8"?>
 <p:sld xmlns:a="http://schemas.openxmlformats.org/drawingml/2006/main" xmlns:r="http://schemas.openxmlformats.org/officeDocument/2006/relationships" xmlns:p="http://schemas.openxmlformats.org/presentationml/2006/main">
   <p:cSld>
     <p:spTree>
@@ -7519,7 +7752,7 @@
           <a:p>
             <a:fld id="{0A3E316F-3D65-2744-BC5B-55B8D60FFFDF}" type="slidenum">
               <a:rPr lang="en-US" smtClean="0"/>
-              <a:t>14</a:t>
+              <a:t>15</a:t>
             </a:fld>
             <a:endParaRPr lang="en-US"/>
           </a:p>
@@ -8363,172 +8596,6 @@
 </p:sld>
 </file>
 
-<file path=ppt/slides/slide15.xml><?xml version="1.0" encoding="utf-8"?>
-<p:sld xmlns:a="http://schemas.openxmlformats.org/drawingml/2006/main" xmlns:r="http://schemas.openxmlformats.org/officeDocument/2006/relationships" xmlns:p="http://schemas.openxmlformats.org/presentationml/2006/main">
-  <p:cSld>
-    <p:spTree>
-      <p:nvGrpSpPr>
-        <p:cNvPr id="1" name=""/>
-        <p:cNvGrpSpPr/>
-        <p:nvPr/>
-      </p:nvGrpSpPr>
-      <p:grpSpPr>
-        <a:xfrm>
-          <a:off x="0" y="0"/>
-          <a:ext cx="0" cy="0"/>
-          <a:chOff x="0" y="0"/>
-          <a:chExt cx="0" cy="0"/>
-        </a:xfrm>
-      </p:grpSpPr>
-      <p:sp>
-        <p:nvSpPr>
-          <p:cNvPr id="2" name="Title 1"/>
-          <p:cNvSpPr>
-            <a:spLocks noGrp="1"/>
-          </p:cNvSpPr>
-          <p:nvPr>
-            <p:ph type="title"/>
-          </p:nvPr>
-        </p:nvSpPr>
-        <p:spPr/>
-        <p:txBody>
-          <a:bodyPr>
-            <a:normAutofit fontScale="90000"/>
-          </a:bodyPr>
-          <a:lstStyle/>
-          <a:p>
-            <a:r>
-              <a:rPr lang="en-US" dirty="0"/>
-              <a:t>Single Instruction – </a:t>
-            </a:r>
-            <a:r>
-              <a:rPr lang="en-US" dirty="0" smtClean="0"/>
-              <a:t>Multiple data</a:t>
-            </a:r>
-            <a:r>
-              <a:rPr lang="en-US" dirty="0"/>
-              <a:t/>
-            </a:r>
-            <a:br>
-              <a:rPr lang="en-US" dirty="0"/>
-            </a:br>
-            <a:r>
-              <a:rPr lang="en-US" sz="2800" dirty="0">
-                <a:solidFill>
-                  <a:schemeClr val="bg1">
-                    <a:lumMod val="50000"/>
-                  </a:schemeClr>
-                </a:solidFill>
-              </a:rPr>
-              <a:t>Converting an image to </a:t>
-            </a:r>
-            <a:r>
-              <a:rPr lang="en-US" sz="2800" dirty="0" smtClean="0">
-                <a:solidFill>
-                  <a:schemeClr val="bg1">
-                    <a:lumMod val="50000"/>
-                  </a:schemeClr>
-                </a:solidFill>
-              </a:rPr>
-              <a:t>gray scale</a:t>
-            </a:r>
-            <a:endParaRPr lang="en-US" dirty="0"/>
-          </a:p>
-        </p:txBody>
-      </p:sp>
-      <p:sp>
-        <p:nvSpPr>
-          <p:cNvPr id="3" name="Content Placeholder 2"/>
-          <p:cNvSpPr>
-            <a:spLocks noGrp="1"/>
-          </p:cNvSpPr>
-          <p:nvPr>
-            <p:ph idx="1"/>
-          </p:nvPr>
-        </p:nvSpPr>
-        <p:spPr/>
-        <p:txBody>
-          <a:bodyPr/>
-          <a:lstStyle/>
-          <a:p>
-            <a:r>
-              <a:rPr lang="en-US" dirty="0" smtClean="0"/>
-              <a:t>ARM NEON uses special registers</a:t>
-            </a:r>
-          </a:p>
-          <a:p>
-            <a:pPr lvl="1"/>
-            <a:r>
-              <a:rPr lang="en-US" dirty="0" smtClean="0"/>
-              <a:t>Separate from CPU registers</a:t>
-            </a:r>
-          </a:p>
-          <a:p>
-            <a:pPr lvl="1"/>
-            <a:r>
-              <a:rPr lang="en-US" dirty="0" smtClean="0"/>
-              <a:t>“Q” and “D”, 128-bit and 64-bit wide</a:t>
-            </a:r>
-          </a:p>
-          <a:p>
-            <a:pPr lvl="1"/>
-            <a:r>
-              <a:rPr lang="en-US" dirty="0" smtClean="0"/>
-              <a:t>Multiple elements per register</a:t>
-            </a:r>
-          </a:p>
-          <a:p>
-            <a:pPr lvl="2"/>
-            <a:r>
-              <a:rPr lang="en-US" dirty="0" smtClean="0"/>
-              <a:t>e.g. 8 * 8 bit in “D” register</a:t>
-            </a:r>
-          </a:p>
-        </p:txBody>
-      </p:sp>
-      <p:sp>
-        <p:nvSpPr>
-          <p:cNvPr id="4" name="Slide Number Placeholder 3"/>
-          <p:cNvSpPr>
-            <a:spLocks noGrp="1"/>
-          </p:cNvSpPr>
-          <p:nvPr>
-            <p:ph type="sldNum" sz="quarter" idx="12"/>
-          </p:nvPr>
-        </p:nvSpPr>
-        <p:spPr/>
-        <p:txBody>
-          <a:bodyPr/>
-          <a:lstStyle/>
-          <a:p>
-            <a:fld id="{0A3E316F-3D65-2744-BC5B-55B8D60FFFDF}" type="slidenum">
-              <a:rPr lang="en-US" smtClean="0"/>
-              <a:t>15</a:t>
-            </a:fld>
-            <a:endParaRPr lang="en-US"/>
-          </a:p>
-        </p:txBody>
-      </p:sp>
-    </p:spTree>
-    <p:extLst>
-      <p:ext uri="{BB962C8B-B14F-4D97-AF65-F5344CB8AC3E}">
-        <p14:creationId xmlns:p14="http://schemas.microsoft.com/office/powerpoint/2010/main" val="526523729"/>
-      </p:ext>
-    </p:extLst>
-  </p:cSld>
-  <p:clrMapOvr>
-    <a:masterClrMapping/>
-  </p:clrMapOvr>
-  <p:timing>
-    <p:tnLst>
-      <p:par>
-        <p:cTn xmlns:p14="http://schemas.microsoft.com/office/powerpoint/2010/main" id="1" dur="indefinite" restart="never" nodeType="tmRoot"/>
-      </p:par>
-    </p:tnLst>
-  </p:timing>
-</p:sld>
-</file>
-
 <file path=ppt/slides/slide16.xml><?xml version="1.0" encoding="utf-8"?>
 <p:sld xmlns:a="http://schemas.openxmlformats.org/drawingml/2006/main" xmlns:r="http://schemas.openxmlformats.org/officeDocument/2006/relationships" xmlns:p="http://schemas.openxmlformats.org/presentationml/2006/main">
   <p:cSld>
@@ -8619,41 +8686,35 @@
           <a:p>
             <a:r>
               <a:rPr lang="en-US" dirty="0" smtClean="0"/>
-              <a:t>Steps to use SIMD:</a:t>
-            </a:r>
-          </a:p>
-          <a:p>
-            <a:pPr marL="971550" lvl="1" indent="-514350">
-              <a:buFont typeface="+mj-lt"/>
-              <a:buAutoNum type="arabicPeriod"/>
-            </a:pPr>
+              <a:t>ARM NEON uses special registers</a:t>
+            </a:r>
+          </a:p>
+          <a:p>
+            <a:pPr lvl="1"/>
             <a:r>
               <a:rPr lang="en-US" dirty="0" smtClean="0"/>
-              <a:t>Load data into NEON registers</a:t>
-            </a:r>
-          </a:p>
-          <a:p>
-            <a:pPr marL="971550" lvl="1" indent="-514350">
-              <a:buFont typeface="+mj-lt"/>
-              <a:buAutoNum type="arabicPeriod"/>
-            </a:pPr>
+              <a:t>Separate from CPU registers</a:t>
+            </a:r>
+          </a:p>
+          <a:p>
+            <a:pPr lvl="1"/>
             <a:r>
               <a:rPr lang="en-US" dirty="0" smtClean="0"/>
-              <a:t>Apply </a:t>
-            </a:r>
-            <a:r>
-              <a:rPr lang="en-US" dirty="0"/>
-              <a:t>operations</a:t>
-            </a:r>
-          </a:p>
-          <a:p>
-            <a:pPr marL="971550" lvl="1" indent="-514350">
-              <a:buFont typeface="+mj-lt"/>
-              <a:buAutoNum type="arabicPeriod"/>
-            </a:pPr>
-            <a:r>
-              <a:rPr lang="en-US" dirty="0"/>
-              <a:t>Write data back to memory</a:t>
+              <a:t>“Q” and “D”, 128-bit and 64-bit wide</a:t>
+            </a:r>
+          </a:p>
+          <a:p>
+            <a:pPr lvl="1"/>
+            <a:r>
+              <a:rPr lang="en-US" dirty="0" smtClean="0"/>
+              <a:t>Multiple elements per register</a:t>
+            </a:r>
+          </a:p>
+          <a:p>
+            <a:pPr lvl="2"/>
+            <a:r>
+              <a:rPr lang="en-US" dirty="0" smtClean="0"/>
+              <a:t>e.g. 8 * 8 bit in “D” register</a:t>
             </a:r>
           </a:p>
         </p:txBody>
@@ -8684,7 +8745,7 @@
     </p:spTree>
     <p:extLst>
       <p:ext uri="{BB962C8B-B14F-4D97-AF65-F5344CB8AC3E}">
-        <p14:creationId xmlns:p14="http://schemas.microsoft.com/office/powerpoint/2010/main" val="2751796948"/>
+        <p14:creationId xmlns:p14="http://schemas.microsoft.com/office/powerpoint/2010/main" val="526523729"/>
       </p:ext>
     </p:extLst>
   </p:cSld>
@@ -8751,16 +8812,82 @@
               <a:rPr lang="en-US" dirty="0"/>
             </a:br>
             <a:r>
-              <a:rPr lang="en-US" sz="2800" dirty="0" smtClean="0">
+              <a:rPr lang="en-US" sz="2800" dirty="0">
                 <a:solidFill>
                   <a:schemeClr val="bg1">
                     <a:lumMod val="50000"/>
                   </a:schemeClr>
                 </a:solidFill>
               </a:rPr>
+              <a:t>Converting an image to </a:t>
+            </a:r>
+            <a:r>
+              <a:rPr lang="en-US" sz="2800" dirty="0" smtClean="0">
+                <a:solidFill>
+                  <a:schemeClr val="bg1">
+                    <a:lumMod val="50000"/>
+                  </a:schemeClr>
+                </a:solidFill>
+              </a:rPr>
+              <a:t>gray scale</a:t>
+            </a:r>
+            <a:endParaRPr lang="en-US" dirty="0"/>
+          </a:p>
+        </p:txBody>
+      </p:sp>
+      <p:sp>
+        <p:nvSpPr>
+          <p:cNvPr id="3" name="Content Placeholder 2"/>
+          <p:cNvSpPr>
+            <a:spLocks noGrp="1"/>
+          </p:cNvSpPr>
+          <p:nvPr>
+            <p:ph idx="1"/>
+          </p:nvPr>
+        </p:nvSpPr>
+        <p:spPr/>
+        <p:txBody>
+          <a:bodyPr/>
+          <a:lstStyle/>
+          <a:p>
+            <a:r>
+              <a:rPr lang="en-US" dirty="0" smtClean="0"/>
+              <a:t>Steps to use SIMD:</a:t>
+            </a:r>
+          </a:p>
+          <a:p>
+            <a:pPr marL="971550" lvl="1" indent="-514350">
+              <a:buFont typeface="+mj-lt"/>
+              <a:buAutoNum type="arabicPeriod"/>
+            </a:pPr>
+            <a:r>
+              <a:rPr lang="en-US" dirty="0" smtClean="0"/>
               <a:t>Load data into NEON registers</a:t>
             </a:r>
-            <a:endParaRPr lang="en-US" dirty="0"/>
+          </a:p>
+          <a:p>
+            <a:pPr marL="971550" lvl="1" indent="-514350">
+              <a:buFont typeface="+mj-lt"/>
+              <a:buAutoNum type="arabicPeriod"/>
+            </a:pPr>
+            <a:r>
+              <a:rPr lang="en-US" dirty="0" smtClean="0"/>
+              <a:t>Apply </a:t>
+            </a:r>
+            <a:r>
+              <a:rPr lang="en-US" dirty="0"/>
+              <a:t>operations</a:t>
+            </a:r>
+          </a:p>
+          <a:p>
+            <a:pPr marL="971550" lvl="1" indent="-514350">
+              <a:buFont typeface="+mj-lt"/>
+              <a:buAutoNum type="arabicPeriod"/>
+            </a:pPr>
+            <a:r>
+              <a:rPr lang="en-US" dirty="0"/>
+              <a:t>Write data back to memory</a:t>
+            </a:r>
           </a:p>
         </p:txBody>
       </p:sp>
@@ -8782,6 +8909,112 @@
             <a:fld id="{0A3E316F-3D65-2744-BC5B-55B8D60FFFDF}" type="slidenum">
               <a:rPr lang="en-US" smtClean="0"/>
               <a:t>17</a:t>
+            </a:fld>
+            <a:endParaRPr lang="en-US"/>
+          </a:p>
+        </p:txBody>
+      </p:sp>
+    </p:spTree>
+    <p:extLst>
+      <p:ext uri="{BB962C8B-B14F-4D97-AF65-F5344CB8AC3E}">
+        <p14:creationId xmlns:p14="http://schemas.microsoft.com/office/powerpoint/2010/main" val="2751796948"/>
+      </p:ext>
+    </p:extLst>
+  </p:cSld>
+  <p:clrMapOvr>
+    <a:masterClrMapping/>
+  </p:clrMapOvr>
+  <p:timing>
+    <p:tnLst>
+      <p:par>
+        <p:cTn xmlns:p14="http://schemas.microsoft.com/office/powerpoint/2010/main" id="1" dur="indefinite" restart="never" nodeType="tmRoot"/>
+      </p:par>
+    </p:tnLst>
+  </p:timing>
+</p:sld>
+</file>
+
+<file path=ppt/slides/slide18.xml><?xml version="1.0" encoding="utf-8"?>
+<p:sld xmlns:a="http://schemas.openxmlformats.org/drawingml/2006/main" xmlns:r="http://schemas.openxmlformats.org/officeDocument/2006/relationships" xmlns:p="http://schemas.openxmlformats.org/presentationml/2006/main">
+  <p:cSld>
+    <p:spTree>
+      <p:nvGrpSpPr>
+        <p:cNvPr id="1" name=""/>
+        <p:cNvGrpSpPr/>
+        <p:nvPr/>
+      </p:nvGrpSpPr>
+      <p:grpSpPr>
+        <a:xfrm>
+          <a:off x="0" y="0"/>
+          <a:ext cx="0" cy="0"/>
+          <a:chOff x="0" y="0"/>
+          <a:chExt cx="0" cy="0"/>
+        </a:xfrm>
+      </p:grpSpPr>
+      <p:sp>
+        <p:nvSpPr>
+          <p:cNvPr id="2" name="Title 1"/>
+          <p:cNvSpPr>
+            <a:spLocks noGrp="1"/>
+          </p:cNvSpPr>
+          <p:nvPr>
+            <p:ph type="title"/>
+          </p:nvPr>
+        </p:nvSpPr>
+        <p:spPr/>
+        <p:txBody>
+          <a:bodyPr>
+            <a:normAutofit fontScale="90000"/>
+          </a:bodyPr>
+          <a:lstStyle/>
+          <a:p>
+            <a:r>
+              <a:rPr lang="en-US" dirty="0"/>
+              <a:t>Single Instruction – </a:t>
+            </a:r>
+            <a:r>
+              <a:rPr lang="en-US" dirty="0" smtClean="0"/>
+              <a:t>Multiple data</a:t>
+            </a:r>
+            <a:r>
+              <a:rPr lang="en-US" dirty="0"/>
+              <a:t/>
+            </a:r>
+            <a:br>
+              <a:rPr lang="en-US" dirty="0"/>
+            </a:br>
+            <a:r>
+              <a:rPr lang="en-US" sz="2800" dirty="0" smtClean="0">
+                <a:solidFill>
+                  <a:schemeClr val="bg1">
+                    <a:lumMod val="50000"/>
+                  </a:schemeClr>
+                </a:solidFill>
+              </a:rPr>
+              <a:t>Load data into NEON registers</a:t>
+            </a:r>
+            <a:endParaRPr lang="en-US" dirty="0"/>
+          </a:p>
+        </p:txBody>
+      </p:sp>
+      <p:sp>
+        <p:nvSpPr>
+          <p:cNvPr id="4" name="Slide Number Placeholder 3"/>
+          <p:cNvSpPr>
+            <a:spLocks noGrp="1"/>
+          </p:cNvSpPr>
+          <p:nvPr>
+            <p:ph type="sldNum" sz="quarter" idx="12"/>
+          </p:nvPr>
+        </p:nvSpPr>
+        <p:spPr/>
+        <p:txBody>
+          <a:bodyPr/>
+          <a:lstStyle/>
+          <a:p>
+            <a:fld id="{0A3E316F-3D65-2744-BC5B-55B8D60FFFDF}" type="slidenum">
+              <a:rPr lang="en-US" smtClean="0"/>
+              <a:t>18</a:t>
             </a:fld>
             <a:endParaRPr lang="en-US"/>
           </a:p>
@@ -8837,7 +9070,7 @@
 </p:sld>
 </file>
 
-<file path=ppt/slides/slide18.xml><?xml version="1.0" encoding="utf-8"?>
+<file path=ppt/slides/slide19.xml><?xml version="1.0" encoding="utf-8"?>
 <p:sld xmlns:a="http://schemas.openxmlformats.org/drawingml/2006/main" xmlns:r="http://schemas.openxmlformats.org/officeDocument/2006/relationships" xmlns:p="http://schemas.openxmlformats.org/presentationml/2006/main">
   <p:cSld>
     <p:spTree>
@@ -8909,7 +9142,7 @@
           <a:p>
             <a:fld id="{0A3E316F-3D65-2744-BC5B-55B8D60FFFDF}" type="slidenum">
               <a:rPr lang="en-US" smtClean="0"/>
-              <a:t>18</a:t>
+              <a:t>19</a:t>
             </a:fld>
             <a:endParaRPr lang="en-US"/>
           </a:p>
@@ -9017,955 +9250,6 @@
     <p:extLst>
       <p:ext uri="{BB962C8B-B14F-4D97-AF65-F5344CB8AC3E}">
         <p14:creationId xmlns:p14="http://schemas.microsoft.com/office/powerpoint/2010/main" val="876821257"/>
-      </p:ext>
-    </p:extLst>
-  </p:cSld>
-  <p:clrMapOvr>
-    <a:masterClrMapping/>
-  </p:clrMapOvr>
-  <p:timing>
-    <p:tnLst>
-      <p:par>
-        <p:cTn xmlns:p14="http://schemas.microsoft.com/office/powerpoint/2010/main" id="1" dur="indefinite" restart="never" nodeType="tmRoot"/>
-      </p:par>
-    </p:tnLst>
-  </p:timing>
-</p:sld>
-</file>
-
-<file path=ppt/slides/slide19.xml><?xml version="1.0" encoding="utf-8"?>
-<p:sld xmlns:a="http://schemas.openxmlformats.org/drawingml/2006/main" xmlns:r="http://schemas.openxmlformats.org/officeDocument/2006/relationships" xmlns:p="http://schemas.openxmlformats.org/presentationml/2006/main">
-  <p:cSld>
-    <p:spTree>
-      <p:nvGrpSpPr>
-        <p:cNvPr id="1" name=""/>
-        <p:cNvGrpSpPr/>
-        <p:nvPr/>
-      </p:nvGrpSpPr>
-      <p:grpSpPr>
-        <a:xfrm>
-          <a:off x="0" y="0"/>
-          <a:ext cx="0" cy="0"/>
-          <a:chOff x="0" y="0"/>
-          <a:chExt cx="0" cy="0"/>
-        </a:xfrm>
-      </p:grpSpPr>
-      <p:sp>
-        <p:nvSpPr>
-          <p:cNvPr id="2" name="Title 1"/>
-          <p:cNvSpPr>
-            <a:spLocks noGrp="1"/>
-          </p:cNvSpPr>
-          <p:nvPr>
-            <p:ph type="title"/>
-          </p:nvPr>
-        </p:nvSpPr>
-        <p:spPr/>
-        <p:txBody>
-          <a:bodyPr>
-            <a:normAutofit fontScale="90000"/>
-          </a:bodyPr>
-          <a:lstStyle/>
-          <a:p>
-            <a:r>
-              <a:rPr lang="en-US" dirty="0" smtClean="0"/>
-              <a:t>Single Instruction – Multiple data</a:t>
-            </a:r>
-            <a:br>
-              <a:rPr lang="en-US" dirty="0" smtClean="0"/>
-            </a:br>
-            <a:r>
-              <a:rPr lang="en-US" sz="2800" dirty="0" smtClean="0">
-                <a:solidFill>
-                  <a:schemeClr val="bg1">
-                    <a:lumMod val="50000"/>
-                  </a:schemeClr>
-                </a:solidFill>
-              </a:rPr>
-              <a:t>Converting to gray scale</a:t>
-            </a:r>
-            <a:endParaRPr lang="en-US" dirty="0"/>
-          </a:p>
-        </p:txBody>
-      </p:sp>
-      <p:sp>
-        <p:nvSpPr>
-          <p:cNvPr id="4" name="Slide Number Placeholder 3"/>
-          <p:cNvSpPr>
-            <a:spLocks noGrp="1"/>
-          </p:cNvSpPr>
-          <p:nvPr>
-            <p:ph type="sldNum" sz="quarter" idx="12"/>
-          </p:nvPr>
-        </p:nvSpPr>
-        <p:spPr/>
-        <p:txBody>
-          <a:bodyPr/>
-          <a:lstStyle/>
-          <a:p>
-            <a:fld id="{0A3E316F-3D65-2744-BC5B-55B8D60FFFDF}" type="slidenum">
-              <a:rPr lang="en-US" smtClean="0"/>
-              <a:t>19</a:t>
-            </a:fld>
-            <a:endParaRPr lang="en-US"/>
-          </a:p>
-        </p:txBody>
-      </p:sp>
-      <p:sp>
-        <p:nvSpPr>
-          <p:cNvPr id="3" name="Rectangle 2"/>
-          <p:cNvSpPr/>
-          <p:nvPr/>
-        </p:nvSpPr>
-        <p:spPr>
-          <a:xfrm>
-            <a:off x="1137506" y="1930200"/>
-            <a:ext cx="6712750" cy="3970318"/>
-          </a:xfrm>
-          <a:prstGeom prst="rect">
-            <a:avLst/>
-          </a:prstGeom>
-        </p:spPr>
-        <p:txBody>
-          <a:bodyPr wrap="square">
-            <a:spAutoFit/>
-          </a:bodyPr>
-          <a:lstStyle/>
-          <a:p>
-            <a:r>
-              <a:rPr lang="nl-NL" dirty="0" err="1">
-                <a:solidFill>
-                  <a:srgbClr val="FF7800"/>
-                </a:solidFill>
-                <a:latin typeface="SourceCodePro-Regular"/>
-              </a:rPr>
-              <a:t>for</a:t>
-            </a:r>
-            <a:r>
-              <a:rPr lang="nl-NL" dirty="0">
-                <a:solidFill>
-                  <a:prstClr val="black"/>
-                </a:solidFill>
-                <a:latin typeface="SourceCodePro-Regular"/>
-              </a:rPr>
-              <a:t>(</a:t>
-            </a:r>
-            <a:r>
-              <a:rPr lang="nl-NL" dirty="0">
-                <a:solidFill>
-                  <a:srgbClr val="FF7800"/>
-                </a:solidFill>
-                <a:latin typeface="SourceCodePro-Regular"/>
-              </a:rPr>
-              <a:t>int</a:t>
-            </a:r>
-            <a:r>
-              <a:rPr lang="nl-NL" dirty="0">
-                <a:solidFill>
-                  <a:prstClr val="black"/>
-                </a:solidFill>
-                <a:latin typeface="SourceCodePro-Regular"/>
-              </a:rPr>
-              <a:t> i=</a:t>
-            </a:r>
-            <a:r>
-              <a:rPr lang="nl-NL" dirty="0">
-                <a:solidFill>
-                  <a:srgbClr val="3B5BB5"/>
-                </a:solidFill>
-                <a:latin typeface="SourceCodePro-Regular"/>
-              </a:rPr>
-              <a:t>0</a:t>
-            </a:r>
-            <a:r>
-              <a:rPr lang="nl-NL" dirty="0">
-                <a:solidFill>
-                  <a:prstClr val="black"/>
-                </a:solidFill>
-                <a:latin typeface="SourceCodePro-Regular"/>
-              </a:rPr>
-              <a:t>; i &lt; pixels; i += FACTOR) {</a:t>
-            </a:r>
-            <a:br>
-              <a:rPr lang="nl-NL" dirty="0">
-                <a:solidFill>
-                  <a:prstClr val="black"/>
-                </a:solidFill>
-                <a:latin typeface="SourceCodePro-Regular"/>
-              </a:rPr>
-            </a:br>
-            <a:r>
-              <a:rPr lang="nl-NL" dirty="0">
-                <a:solidFill>
-                  <a:prstClr val="black"/>
-                </a:solidFill>
-                <a:latin typeface="SourceCodePro-Regular"/>
-              </a:rPr>
-              <a:t>    uint8x8x3_t </a:t>
-            </a:r>
-            <a:r>
-              <a:rPr lang="nl-NL" dirty="0" err="1" smtClean="0">
-                <a:solidFill>
-                  <a:prstClr val="black"/>
-                </a:solidFill>
-                <a:latin typeface="SourceCodePro-Regular"/>
-              </a:rPr>
-              <a:t>rgb</a:t>
-            </a:r>
-            <a:r>
-              <a:rPr lang="nl-NL" dirty="0" smtClean="0">
-                <a:solidFill>
-                  <a:prstClr val="black"/>
-                </a:solidFill>
-                <a:latin typeface="SourceCodePro-Regular"/>
-              </a:rPr>
-              <a:t> </a:t>
-            </a:r>
-            <a:r>
-              <a:rPr lang="nl-NL" dirty="0">
-                <a:solidFill>
-                  <a:prstClr val="black"/>
-                </a:solidFill>
-                <a:latin typeface="SourceCodePro-Regular"/>
-              </a:rPr>
-              <a:t>= </a:t>
-            </a:r>
-            <a:r>
-              <a:rPr lang="nl-NL" dirty="0">
-                <a:solidFill>
-                  <a:srgbClr val="3B5BB5"/>
-                </a:solidFill>
-                <a:latin typeface="SourceCodePro-Regular"/>
-              </a:rPr>
-              <a:t>vld3_u8</a:t>
-            </a:r>
-            <a:r>
-              <a:rPr lang="nl-NL" dirty="0">
-                <a:solidFill>
-                  <a:prstClr val="black"/>
-                </a:solidFill>
-                <a:latin typeface="SourceCodePro-Regular"/>
-              </a:rPr>
-              <a:t>(</a:t>
-            </a:r>
-            <a:r>
-              <a:rPr lang="nl-NL" dirty="0" err="1">
-                <a:solidFill>
-                  <a:prstClr val="black"/>
-                </a:solidFill>
-                <a:latin typeface="SourceCodePro-Regular"/>
-              </a:rPr>
-              <a:t>src</a:t>
-            </a:r>
-            <a:r>
-              <a:rPr lang="nl-NL" dirty="0">
-                <a:solidFill>
-                  <a:prstClr val="black"/>
-                </a:solidFill>
-                <a:latin typeface="SourceCodePro-Regular"/>
-              </a:rPr>
-              <a:t>);</a:t>
-            </a:r>
-            <a:br>
-              <a:rPr lang="nl-NL" dirty="0">
-                <a:solidFill>
-                  <a:prstClr val="black"/>
-                </a:solidFill>
-                <a:latin typeface="SourceCodePro-Regular"/>
-              </a:rPr>
-            </a:br>
-            <a:r>
-              <a:rPr lang="nl-NL" dirty="0">
-                <a:solidFill>
-                  <a:prstClr val="black"/>
-                </a:solidFill>
-                <a:latin typeface="SourceCodePro-Regular"/>
-              </a:rPr>
-              <a:t>    uint16x8_t </a:t>
-            </a:r>
-            <a:r>
-              <a:rPr lang="nl-NL" dirty="0" err="1">
-                <a:solidFill>
-                  <a:prstClr val="black"/>
-                </a:solidFill>
-                <a:latin typeface="SourceCodePro-Regular"/>
-              </a:rPr>
-              <a:t>acc</a:t>
-            </a:r>
-            <a:r>
-              <a:rPr lang="nl-NL" dirty="0">
-                <a:solidFill>
-                  <a:prstClr val="black"/>
-                </a:solidFill>
-                <a:latin typeface="SourceCodePro-Regular"/>
-              </a:rPr>
-              <a:t>;</a:t>
-            </a:r>
-            <a:br>
-              <a:rPr lang="nl-NL" dirty="0">
-                <a:solidFill>
-                  <a:prstClr val="black"/>
-                </a:solidFill>
-                <a:latin typeface="SourceCodePro-Regular"/>
-              </a:rPr>
-            </a:br>
-            <a:r>
-              <a:rPr lang="nl-NL" dirty="0">
-                <a:solidFill>
-                  <a:prstClr val="black"/>
-                </a:solidFill>
-                <a:latin typeface="SourceCodePro-Regular"/>
-              </a:rPr>
-              <a:t>    </a:t>
-            </a:r>
-            <a:br>
-              <a:rPr lang="nl-NL" dirty="0">
-                <a:solidFill>
-                  <a:prstClr val="black"/>
-                </a:solidFill>
-                <a:latin typeface="SourceCodePro-Regular"/>
-              </a:rPr>
-            </a:br>
-            <a:r>
-              <a:rPr lang="nl-NL" dirty="0">
-                <a:solidFill>
-                  <a:prstClr val="black"/>
-                </a:solidFill>
-                <a:latin typeface="SourceCodePro-Regular"/>
-              </a:rPr>
-              <a:t>    </a:t>
-            </a:r>
-            <a:r>
-              <a:rPr lang="nl-NL" dirty="0" err="1">
-                <a:solidFill>
-                  <a:prstClr val="black"/>
-                </a:solidFill>
-                <a:latin typeface="SourceCodePro-Regular"/>
-              </a:rPr>
-              <a:t>acc</a:t>
-            </a:r>
-            <a:r>
-              <a:rPr lang="nl-NL" dirty="0">
-                <a:solidFill>
-                  <a:prstClr val="black"/>
-                </a:solidFill>
-                <a:latin typeface="SourceCodePro-Regular"/>
-              </a:rPr>
-              <a:t> = </a:t>
-            </a:r>
-            <a:r>
-              <a:rPr lang="nl-NL" dirty="0">
-                <a:solidFill>
-                  <a:srgbClr val="3B5BB5"/>
-                </a:solidFill>
-                <a:latin typeface="SourceCodePro-Regular"/>
-              </a:rPr>
-              <a:t>vmull_u8</a:t>
-            </a:r>
-            <a:r>
-              <a:rPr lang="nl-NL" dirty="0">
-                <a:solidFill>
-                  <a:prstClr val="black"/>
-                </a:solidFill>
-                <a:latin typeface="SourceCodePro-Regular"/>
-              </a:rPr>
-              <a:t>(</a:t>
-            </a:r>
-            <a:r>
-              <a:rPr lang="nl-NL" dirty="0" err="1" smtClean="0">
-                <a:solidFill>
-                  <a:prstClr val="black"/>
-                </a:solidFill>
-                <a:latin typeface="SourceCodePro-Regular"/>
-              </a:rPr>
-              <a:t>rgb.val</a:t>
-            </a:r>
-            <a:r>
-              <a:rPr lang="nl-NL" dirty="0">
-                <a:solidFill>
-                  <a:prstClr val="black"/>
-                </a:solidFill>
-                <a:latin typeface="SourceCodePro-Regular"/>
-              </a:rPr>
-              <a:t>[</a:t>
-            </a:r>
-            <a:r>
-              <a:rPr lang="nl-NL" dirty="0">
-                <a:solidFill>
-                  <a:srgbClr val="3B5BB5"/>
-                </a:solidFill>
-                <a:latin typeface="SourceCodePro-Regular"/>
-              </a:rPr>
-              <a:t>0</a:t>
-            </a:r>
-            <a:r>
-              <a:rPr lang="nl-NL" dirty="0">
-                <a:solidFill>
-                  <a:prstClr val="black"/>
-                </a:solidFill>
-                <a:latin typeface="SourceCodePro-Regular"/>
-              </a:rPr>
-              <a:t>], </a:t>
-            </a:r>
-            <a:r>
-              <a:rPr lang="nl-NL" dirty="0" err="1">
-                <a:solidFill>
-                  <a:prstClr val="black"/>
-                </a:solidFill>
-                <a:latin typeface="SourceCodePro-Regular"/>
-              </a:rPr>
-              <a:t>rcoeff</a:t>
-            </a:r>
-            <a:r>
-              <a:rPr lang="nl-NL" dirty="0">
-                <a:solidFill>
-                  <a:prstClr val="black"/>
-                </a:solidFill>
-                <a:latin typeface="SourceCodePro-Regular"/>
-              </a:rPr>
-              <a:t>);</a:t>
-            </a:r>
-            <a:br>
-              <a:rPr lang="nl-NL" dirty="0">
-                <a:solidFill>
-                  <a:prstClr val="black"/>
-                </a:solidFill>
-                <a:latin typeface="SourceCodePro-Regular"/>
-              </a:rPr>
-            </a:br>
-            <a:r>
-              <a:rPr lang="nl-NL" dirty="0">
-                <a:solidFill>
-                  <a:prstClr val="black"/>
-                </a:solidFill>
-                <a:latin typeface="SourceCodePro-Regular"/>
-              </a:rPr>
-              <a:t>    </a:t>
-            </a:r>
-            <a:r>
-              <a:rPr lang="nl-NL" dirty="0" err="1">
-                <a:solidFill>
-                  <a:prstClr val="black"/>
-                </a:solidFill>
-                <a:latin typeface="SourceCodePro-Regular"/>
-              </a:rPr>
-              <a:t>acc</a:t>
-            </a:r>
-            <a:r>
-              <a:rPr lang="nl-NL" dirty="0">
-                <a:solidFill>
-                  <a:prstClr val="black"/>
-                </a:solidFill>
-                <a:latin typeface="SourceCodePro-Regular"/>
-              </a:rPr>
-              <a:t> = </a:t>
-            </a:r>
-            <a:r>
-              <a:rPr lang="nl-NL" dirty="0">
-                <a:solidFill>
-                  <a:srgbClr val="3B5BB5"/>
-                </a:solidFill>
-                <a:latin typeface="SourceCodePro-Regular"/>
-              </a:rPr>
-              <a:t>vmlal_u8</a:t>
-            </a:r>
-            <a:r>
-              <a:rPr lang="nl-NL" dirty="0">
-                <a:solidFill>
-                  <a:prstClr val="black"/>
-                </a:solidFill>
-                <a:latin typeface="SourceCodePro-Regular"/>
-              </a:rPr>
-              <a:t>(</a:t>
-            </a:r>
-            <a:r>
-              <a:rPr lang="nl-NL" dirty="0" err="1">
-                <a:solidFill>
-                  <a:prstClr val="black"/>
-                </a:solidFill>
-                <a:latin typeface="SourceCodePro-Regular"/>
-              </a:rPr>
-              <a:t>acc</a:t>
-            </a:r>
-            <a:r>
-              <a:rPr lang="nl-NL" dirty="0">
-                <a:solidFill>
-                  <a:prstClr val="black"/>
-                </a:solidFill>
-                <a:latin typeface="SourceCodePro-Regular"/>
-              </a:rPr>
-              <a:t>, </a:t>
-            </a:r>
-            <a:r>
-              <a:rPr lang="nl-NL" dirty="0" err="1" smtClean="0">
-                <a:solidFill>
-                  <a:prstClr val="black"/>
-                </a:solidFill>
-                <a:latin typeface="SourceCodePro-Regular"/>
-              </a:rPr>
-              <a:t>rgb.val</a:t>
-            </a:r>
-            <a:r>
-              <a:rPr lang="nl-NL" dirty="0">
-                <a:solidFill>
-                  <a:prstClr val="black"/>
-                </a:solidFill>
-                <a:latin typeface="SourceCodePro-Regular"/>
-              </a:rPr>
-              <a:t>[</a:t>
-            </a:r>
-            <a:r>
-              <a:rPr lang="nl-NL" dirty="0">
-                <a:solidFill>
-                  <a:srgbClr val="3B5BB5"/>
-                </a:solidFill>
-                <a:latin typeface="SourceCodePro-Regular"/>
-              </a:rPr>
-              <a:t>1</a:t>
-            </a:r>
-            <a:r>
-              <a:rPr lang="nl-NL" dirty="0">
-                <a:solidFill>
-                  <a:prstClr val="black"/>
-                </a:solidFill>
-                <a:latin typeface="SourceCodePro-Regular"/>
-              </a:rPr>
-              <a:t>], </a:t>
-            </a:r>
-            <a:r>
-              <a:rPr lang="nl-NL" dirty="0" err="1">
-                <a:solidFill>
-                  <a:prstClr val="black"/>
-                </a:solidFill>
-                <a:latin typeface="SourceCodePro-Regular"/>
-              </a:rPr>
-              <a:t>gcoeff</a:t>
-            </a:r>
-            <a:r>
-              <a:rPr lang="nl-NL" dirty="0">
-                <a:solidFill>
-                  <a:prstClr val="black"/>
-                </a:solidFill>
-                <a:latin typeface="SourceCodePro-Regular"/>
-              </a:rPr>
-              <a:t>);</a:t>
-            </a:r>
-            <a:br>
-              <a:rPr lang="nl-NL" dirty="0">
-                <a:solidFill>
-                  <a:prstClr val="black"/>
-                </a:solidFill>
-                <a:latin typeface="SourceCodePro-Regular"/>
-              </a:rPr>
-            </a:br>
-            <a:r>
-              <a:rPr lang="nl-NL" dirty="0">
-                <a:solidFill>
-                  <a:prstClr val="black"/>
-                </a:solidFill>
-                <a:latin typeface="SourceCodePro-Regular"/>
-              </a:rPr>
-              <a:t>    </a:t>
-            </a:r>
-            <a:r>
-              <a:rPr lang="nl-NL" dirty="0" err="1">
-                <a:solidFill>
-                  <a:prstClr val="black"/>
-                </a:solidFill>
-                <a:latin typeface="SourceCodePro-Regular"/>
-              </a:rPr>
-              <a:t>acc</a:t>
-            </a:r>
-            <a:r>
-              <a:rPr lang="nl-NL" dirty="0">
-                <a:solidFill>
-                  <a:prstClr val="black"/>
-                </a:solidFill>
-                <a:latin typeface="SourceCodePro-Regular"/>
-              </a:rPr>
-              <a:t> = </a:t>
-            </a:r>
-            <a:r>
-              <a:rPr lang="nl-NL" dirty="0">
-                <a:solidFill>
-                  <a:srgbClr val="3B5BB5"/>
-                </a:solidFill>
-                <a:latin typeface="SourceCodePro-Regular"/>
-              </a:rPr>
-              <a:t>vmlal_u8</a:t>
-            </a:r>
-            <a:r>
-              <a:rPr lang="nl-NL" dirty="0">
-                <a:solidFill>
-                  <a:prstClr val="black"/>
-                </a:solidFill>
-                <a:latin typeface="SourceCodePro-Regular"/>
-              </a:rPr>
-              <a:t>(</a:t>
-            </a:r>
-            <a:r>
-              <a:rPr lang="nl-NL" dirty="0" err="1">
-                <a:solidFill>
-                  <a:prstClr val="black"/>
-                </a:solidFill>
-                <a:latin typeface="SourceCodePro-Regular"/>
-              </a:rPr>
-              <a:t>acc</a:t>
-            </a:r>
-            <a:r>
-              <a:rPr lang="nl-NL" dirty="0">
-                <a:solidFill>
-                  <a:prstClr val="black"/>
-                </a:solidFill>
-                <a:latin typeface="SourceCodePro-Regular"/>
-              </a:rPr>
-              <a:t>, </a:t>
-            </a:r>
-            <a:r>
-              <a:rPr lang="nl-NL" dirty="0" err="1" smtClean="0">
-                <a:solidFill>
-                  <a:prstClr val="black"/>
-                </a:solidFill>
-                <a:latin typeface="SourceCodePro-Regular"/>
-              </a:rPr>
-              <a:t>rgb.val</a:t>
-            </a:r>
-            <a:r>
-              <a:rPr lang="nl-NL" dirty="0">
-                <a:solidFill>
-                  <a:prstClr val="black"/>
-                </a:solidFill>
-                <a:latin typeface="SourceCodePro-Regular"/>
-              </a:rPr>
-              <a:t>[</a:t>
-            </a:r>
-            <a:r>
-              <a:rPr lang="nl-NL" dirty="0">
-                <a:solidFill>
-                  <a:srgbClr val="3B5BB5"/>
-                </a:solidFill>
-                <a:latin typeface="SourceCodePro-Regular"/>
-              </a:rPr>
-              <a:t>2</a:t>
-            </a:r>
-            <a:r>
-              <a:rPr lang="nl-NL" dirty="0">
-                <a:solidFill>
-                  <a:prstClr val="black"/>
-                </a:solidFill>
-                <a:latin typeface="SourceCodePro-Regular"/>
-              </a:rPr>
-              <a:t>], </a:t>
-            </a:r>
-            <a:r>
-              <a:rPr lang="nl-NL" dirty="0" err="1">
-                <a:solidFill>
-                  <a:prstClr val="black"/>
-                </a:solidFill>
-                <a:latin typeface="SourceCodePro-Regular"/>
-              </a:rPr>
-              <a:t>bcoeff</a:t>
-            </a:r>
-            <a:r>
-              <a:rPr lang="nl-NL" dirty="0">
-                <a:solidFill>
-                  <a:prstClr val="black"/>
-                </a:solidFill>
-                <a:latin typeface="SourceCodePro-Regular"/>
-              </a:rPr>
-              <a:t>);</a:t>
-            </a:r>
-            <a:br>
-              <a:rPr lang="nl-NL" dirty="0">
-                <a:solidFill>
-                  <a:prstClr val="black"/>
-                </a:solidFill>
-                <a:latin typeface="SourceCodePro-Regular"/>
-              </a:rPr>
-            </a:br>
-            <a:r>
-              <a:rPr lang="nl-NL" dirty="0">
-                <a:solidFill>
-                  <a:prstClr val="black"/>
-                </a:solidFill>
-                <a:latin typeface="SourceCodePro-Regular"/>
-              </a:rPr>
-              <a:t>    </a:t>
-            </a:r>
-            <a:br>
-              <a:rPr lang="nl-NL" dirty="0">
-                <a:solidFill>
-                  <a:prstClr val="black"/>
-                </a:solidFill>
-                <a:latin typeface="SourceCodePro-Regular"/>
-              </a:rPr>
-            </a:br>
-            <a:r>
-              <a:rPr lang="nl-NL" dirty="0">
-                <a:solidFill>
-                  <a:prstClr val="black"/>
-                </a:solidFill>
-                <a:latin typeface="SourceCodePro-Regular"/>
-              </a:rPr>
-              <a:t>    uint8x8_t </a:t>
-            </a:r>
-            <a:r>
-              <a:rPr lang="nl-NL" dirty="0" err="1">
-                <a:solidFill>
-                  <a:prstClr val="black"/>
-                </a:solidFill>
-                <a:latin typeface="SourceCodePro-Regular"/>
-              </a:rPr>
-              <a:t>result</a:t>
-            </a:r>
-            <a:r>
-              <a:rPr lang="nl-NL" dirty="0">
-                <a:solidFill>
-                  <a:prstClr val="black"/>
-                </a:solidFill>
-                <a:latin typeface="SourceCodePro-Regular"/>
-              </a:rPr>
-              <a:t> = </a:t>
-            </a:r>
-            <a:r>
-              <a:rPr lang="nl-NL" dirty="0">
-                <a:solidFill>
-                  <a:srgbClr val="3B5BB5"/>
-                </a:solidFill>
-                <a:latin typeface="SourceCodePro-Regular"/>
-              </a:rPr>
-              <a:t>vshrn_n_u16</a:t>
-            </a:r>
-            <a:r>
-              <a:rPr lang="nl-NL" dirty="0">
-                <a:solidFill>
-                  <a:prstClr val="black"/>
-                </a:solidFill>
-                <a:latin typeface="SourceCodePro-Regular"/>
-              </a:rPr>
-              <a:t>(</a:t>
-            </a:r>
-            <a:r>
-              <a:rPr lang="nl-NL" dirty="0" err="1">
-                <a:solidFill>
-                  <a:prstClr val="black"/>
-                </a:solidFill>
-                <a:latin typeface="SourceCodePro-Regular"/>
-              </a:rPr>
-              <a:t>acc</a:t>
-            </a:r>
-            <a:r>
-              <a:rPr lang="nl-NL" dirty="0">
-                <a:solidFill>
-                  <a:prstClr val="black"/>
-                </a:solidFill>
-                <a:latin typeface="SourceCodePro-Regular"/>
-              </a:rPr>
-              <a:t>, </a:t>
-            </a:r>
-            <a:r>
-              <a:rPr lang="nl-NL" dirty="0">
-                <a:solidFill>
-                  <a:srgbClr val="3B5BB5"/>
-                </a:solidFill>
-                <a:latin typeface="SourceCodePro-Regular"/>
-              </a:rPr>
-              <a:t>8</a:t>
-            </a:r>
-            <a:r>
-              <a:rPr lang="nl-NL" dirty="0">
-                <a:solidFill>
-                  <a:prstClr val="black"/>
-                </a:solidFill>
-                <a:latin typeface="SourceCodePro-Regular"/>
-              </a:rPr>
-              <a:t>);</a:t>
-            </a:r>
-            <a:br>
-              <a:rPr lang="nl-NL" dirty="0">
-                <a:solidFill>
-                  <a:prstClr val="black"/>
-                </a:solidFill>
-                <a:latin typeface="SourceCodePro-Regular"/>
-              </a:rPr>
-            </a:br>
-            <a:r>
-              <a:rPr lang="nl-NL" dirty="0">
-                <a:solidFill>
-                  <a:prstClr val="black"/>
-                </a:solidFill>
-                <a:latin typeface="SourceCodePro-Regular"/>
-              </a:rPr>
-              <a:t>    </a:t>
-            </a:r>
-            <a:r>
-              <a:rPr lang="nl-NL" dirty="0">
-                <a:solidFill>
-                  <a:srgbClr val="3B5BB5"/>
-                </a:solidFill>
-                <a:latin typeface="SourceCodePro-Regular"/>
-              </a:rPr>
-              <a:t>vst1_u8</a:t>
-            </a:r>
-            <a:r>
-              <a:rPr lang="nl-NL" dirty="0">
-                <a:solidFill>
-                  <a:prstClr val="black"/>
-                </a:solidFill>
-                <a:latin typeface="SourceCodePro-Regular"/>
-              </a:rPr>
-              <a:t>(</a:t>
-            </a:r>
-            <a:r>
-              <a:rPr lang="nl-NL" dirty="0" err="1">
-                <a:solidFill>
-                  <a:prstClr val="black"/>
-                </a:solidFill>
-                <a:latin typeface="SourceCodePro-Regular"/>
-              </a:rPr>
-              <a:t>dest</a:t>
-            </a:r>
-            <a:r>
-              <a:rPr lang="nl-NL" dirty="0">
-                <a:solidFill>
-                  <a:prstClr val="black"/>
-                </a:solidFill>
-                <a:latin typeface="SourceCodePro-Regular"/>
-              </a:rPr>
-              <a:t>, </a:t>
-            </a:r>
-            <a:r>
-              <a:rPr lang="nl-NL" dirty="0" err="1">
-                <a:solidFill>
-                  <a:prstClr val="black"/>
-                </a:solidFill>
-                <a:latin typeface="SourceCodePro-Regular"/>
-              </a:rPr>
-              <a:t>result</a:t>
-            </a:r>
-            <a:r>
-              <a:rPr lang="nl-NL" dirty="0">
-                <a:solidFill>
-                  <a:prstClr val="black"/>
-                </a:solidFill>
-                <a:latin typeface="SourceCodePro-Regular"/>
-              </a:rPr>
-              <a:t>);</a:t>
-            </a:r>
-            <a:br>
-              <a:rPr lang="nl-NL" dirty="0">
-                <a:solidFill>
-                  <a:prstClr val="black"/>
-                </a:solidFill>
-                <a:latin typeface="SourceCodePro-Regular"/>
-              </a:rPr>
-            </a:br>
-            <a:r>
-              <a:rPr lang="nl-NL" dirty="0">
-                <a:solidFill>
-                  <a:prstClr val="black"/>
-                </a:solidFill>
-                <a:latin typeface="SourceCodePro-Regular"/>
-              </a:rPr>
-              <a:t>       </a:t>
-            </a:r>
-            <a:br>
-              <a:rPr lang="nl-NL" dirty="0">
-                <a:solidFill>
-                  <a:prstClr val="black"/>
-                </a:solidFill>
-                <a:latin typeface="SourceCodePro-Regular"/>
-              </a:rPr>
-            </a:br>
-            <a:r>
-              <a:rPr lang="nl-NL" dirty="0">
-                <a:solidFill>
-                  <a:prstClr val="black"/>
-                </a:solidFill>
-                <a:latin typeface="SourceCodePro-Regular"/>
-              </a:rPr>
-              <a:t>    </a:t>
-            </a:r>
-            <a:r>
-              <a:rPr lang="nl-NL" dirty="0" err="1">
-                <a:solidFill>
-                  <a:prstClr val="black"/>
-                </a:solidFill>
-                <a:latin typeface="SourceCodePro-Regular"/>
-              </a:rPr>
-              <a:t>src</a:t>
-            </a:r>
-            <a:r>
-              <a:rPr lang="nl-NL" dirty="0">
-                <a:solidFill>
-                  <a:prstClr val="black"/>
-                </a:solidFill>
-                <a:latin typeface="SourceCodePro-Regular"/>
-              </a:rPr>
-              <a:t> += FACTOR;</a:t>
-            </a:r>
-            <a:br>
-              <a:rPr lang="nl-NL" dirty="0">
-                <a:solidFill>
-                  <a:prstClr val="black"/>
-                </a:solidFill>
-                <a:latin typeface="SourceCodePro-Regular"/>
-              </a:rPr>
-            </a:br>
-            <a:r>
-              <a:rPr lang="nl-NL" dirty="0">
-                <a:solidFill>
-                  <a:prstClr val="black"/>
-                </a:solidFill>
-                <a:latin typeface="SourceCodePro-Regular"/>
-              </a:rPr>
-              <a:t>    </a:t>
-            </a:r>
-            <a:r>
-              <a:rPr lang="nl-NL" dirty="0" err="1">
-                <a:solidFill>
-                  <a:prstClr val="black"/>
-                </a:solidFill>
-                <a:latin typeface="SourceCodePro-Regular"/>
-              </a:rPr>
-              <a:t>dest</a:t>
-            </a:r>
-            <a:r>
-              <a:rPr lang="nl-NL" dirty="0">
-                <a:solidFill>
-                  <a:prstClr val="black"/>
-                </a:solidFill>
-                <a:latin typeface="SourceCodePro-Regular"/>
-              </a:rPr>
-              <a:t> += FACTOR;</a:t>
-            </a:r>
-            <a:br>
-              <a:rPr lang="nl-NL" dirty="0">
-                <a:solidFill>
-                  <a:prstClr val="black"/>
-                </a:solidFill>
-                <a:latin typeface="SourceCodePro-Regular"/>
-              </a:rPr>
-            </a:br>
-            <a:r>
-              <a:rPr lang="nl-NL" dirty="0">
-                <a:solidFill>
-                  <a:prstClr val="black"/>
-                </a:solidFill>
-                <a:latin typeface="SourceCodePro-Regular"/>
-              </a:rPr>
-              <a:t>}</a:t>
-            </a:r>
-            <a:endParaRPr lang="en-US" dirty="0">
-              <a:latin typeface="HelveticaNeueLT Com 45 Lt"/>
-            </a:endParaRPr>
-          </a:p>
-        </p:txBody>
-      </p:sp>
-    </p:spTree>
-    <p:extLst>
-      <p:ext uri="{BB962C8B-B14F-4D97-AF65-F5344CB8AC3E}">
-        <p14:creationId xmlns:p14="http://schemas.microsoft.com/office/powerpoint/2010/main" val="3282497539"/>
       </p:ext>
     </p:extLst>
   </p:cSld>
@@ -11058,6 +10342,955 @@
           </a:p>
         </p:txBody>
       </p:sp>
+    </p:spTree>
+    <p:extLst>
+      <p:ext uri="{BB962C8B-B14F-4D97-AF65-F5344CB8AC3E}">
+        <p14:creationId xmlns:p14="http://schemas.microsoft.com/office/powerpoint/2010/main" val="3282497539"/>
+      </p:ext>
+    </p:extLst>
+  </p:cSld>
+  <p:clrMapOvr>
+    <a:masterClrMapping/>
+  </p:clrMapOvr>
+  <p:timing>
+    <p:tnLst>
+      <p:par>
+        <p:cTn xmlns:p14="http://schemas.microsoft.com/office/powerpoint/2010/main" id="1" dur="indefinite" restart="never" nodeType="tmRoot"/>
+      </p:par>
+    </p:tnLst>
+  </p:timing>
+</p:sld>
+</file>
+
+<file path=ppt/slides/slide21.xml><?xml version="1.0" encoding="utf-8"?>
+<p:sld xmlns:a="http://schemas.openxmlformats.org/drawingml/2006/main" xmlns:r="http://schemas.openxmlformats.org/officeDocument/2006/relationships" xmlns:p="http://schemas.openxmlformats.org/presentationml/2006/main">
+  <p:cSld>
+    <p:spTree>
+      <p:nvGrpSpPr>
+        <p:cNvPr id="1" name=""/>
+        <p:cNvGrpSpPr/>
+        <p:nvPr/>
+      </p:nvGrpSpPr>
+      <p:grpSpPr>
+        <a:xfrm>
+          <a:off x="0" y="0"/>
+          <a:ext cx="0" cy="0"/>
+          <a:chOff x="0" y="0"/>
+          <a:chExt cx="0" cy="0"/>
+        </a:xfrm>
+      </p:grpSpPr>
+      <p:sp>
+        <p:nvSpPr>
+          <p:cNvPr id="2" name="Title 1"/>
+          <p:cNvSpPr>
+            <a:spLocks noGrp="1"/>
+          </p:cNvSpPr>
+          <p:nvPr>
+            <p:ph type="title"/>
+          </p:nvPr>
+        </p:nvSpPr>
+        <p:spPr/>
+        <p:txBody>
+          <a:bodyPr>
+            <a:normAutofit fontScale="90000"/>
+          </a:bodyPr>
+          <a:lstStyle/>
+          <a:p>
+            <a:r>
+              <a:rPr lang="en-US" dirty="0" smtClean="0"/>
+              <a:t>Single Instruction – Multiple data</a:t>
+            </a:r>
+            <a:br>
+              <a:rPr lang="en-US" dirty="0" smtClean="0"/>
+            </a:br>
+            <a:r>
+              <a:rPr lang="en-US" sz="2800" dirty="0" smtClean="0">
+                <a:solidFill>
+                  <a:schemeClr val="bg1">
+                    <a:lumMod val="50000"/>
+                  </a:schemeClr>
+                </a:solidFill>
+              </a:rPr>
+              <a:t>Converting to gray scale</a:t>
+            </a:r>
+            <a:endParaRPr lang="en-US" dirty="0"/>
+          </a:p>
+        </p:txBody>
+      </p:sp>
+      <p:sp>
+        <p:nvSpPr>
+          <p:cNvPr id="4" name="Slide Number Placeholder 3"/>
+          <p:cNvSpPr>
+            <a:spLocks noGrp="1"/>
+          </p:cNvSpPr>
+          <p:nvPr>
+            <p:ph type="sldNum" sz="quarter" idx="12"/>
+          </p:nvPr>
+        </p:nvSpPr>
+        <p:spPr/>
+        <p:txBody>
+          <a:bodyPr/>
+          <a:lstStyle/>
+          <a:p>
+            <a:fld id="{0A3E316F-3D65-2744-BC5B-55B8D60FFFDF}" type="slidenum">
+              <a:rPr lang="en-US" smtClean="0"/>
+              <a:t>21</a:t>
+            </a:fld>
+            <a:endParaRPr lang="en-US"/>
+          </a:p>
+        </p:txBody>
+      </p:sp>
+      <p:sp>
+        <p:nvSpPr>
+          <p:cNvPr id="3" name="Rectangle 2"/>
+          <p:cNvSpPr/>
+          <p:nvPr/>
+        </p:nvSpPr>
+        <p:spPr>
+          <a:xfrm>
+            <a:off x="1137506" y="1930200"/>
+            <a:ext cx="6712750" cy="3970318"/>
+          </a:xfrm>
+          <a:prstGeom prst="rect">
+            <a:avLst/>
+          </a:prstGeom>
+        </p:spPr>
+        <p:txBody>
+          <a:bodyPr wrap="square">
+            <a:spAutoFit/>
+          </a:bodyPr>
+          <a:lstStyle/>
+          <a:p>
+            <a:r>
+              <a:rPr lang="nl-NL" dirty="0" err="1">
+                <a:solidFill>
+                  <a:srgbClr val="FF7800"/>
+                </a:solidFill>
+                <a:latin typeface="SourceCodePro-Regular"/>
+              </a:rPr>
+              <a:t>for</a:t>
+            </a:r>
+            <a:r>
+              <a:rPr lang="nl-NL" dirty="0">
+                <a:solidFill>
+                  <a:prstClr val="black"/>
+                </a:solidFill>
+                <a:latin typeface="SourceCodePro-Regular"/>
+              </a:rPr>
+              <a:t>(</a:t>
+            </a:r>
+            <a:r>
+              <a:rPr lang="nl-NL" dirty="0">
+                <a:solidFill>
+                  <a:srgbClr val="FF7800"/>
+                </a:solidFill>
+                <a:latin typeface="SourceCodePro-Regular"/>
+              </a:rPr>
+              <a:t>int</a:t>
+            </a:r>
+            <a:r>
+              <a:rPr lang="nl-NL" dirty="0">
+                <a:solidFill>
+                  <a:prstClr val="black"/>
+                </a:solidFill>
+                <a:latin typeface="SourceCodePro-Regular"/>
+              </a:rPr>
+              <a:t> i=</a:t>
+            </a:r>
+            <a:r>
+              <a:rPr lang="nl-NL" dirty="0">
+                <a:solidFill>
+                  <a:srgbClr val="3B5BB5"/>
+                </a:solidFill>
+                <a:latin typeface="SourceCodePro-Regular"/>
+              </a:rPr>
+              <a:t>0</a:t>
+            </a:r>
+            <a:r>
+              <a:rPr lang="nl-NL" dirty="0">
+                <a:solidFill>
+                  <a:prstClr val="black"/>
+                </a:solidFill>
+                <a:latin typeface="SourceCodePro-Regular"/>
+              </a:rPr>
+              <a:t>; i &lt; pixels; i += FACTOR) {</a:t>
+            </a:r>
+            <a:br>
+              <a:rPr lang="nl-NL" dirty="0">
+                <a:solidFill>
+                  <a:prstClr val="black"/>
+                </a:solidFill>
+                <a:latin typeface="SourceCodePro-Regular"/>
+              </a:rPr>
+            </a:br>
+            <a:r>
+              <a:rPr lang="nl-NL" dirty="0">
+                <a:solidFill>
+                  <a:prstClr val="black"/>
+                </a:solidFill>
+                <a:latin typeface="SourceCodePro-Regular"/>
+              </a:rPr>
+              <a:t>    uint8x8x3_t </a:t>
+            </a:r>
+            <a:r>
+              <a:rPr lang="nl-NL" dirty="0" err="1" smtClean="0">
+                <a:solidFill>
+                  <a:prstClr val="black"/>
+                </a:solidFill>
+                <a:latin typeface="SourceCodePro-Regular"/>
+              </a:rPr>
+              <a:t>rgb</a:t>
+            </a:r>
+            <a:r>
+              <a:rPr lang="nl-NL" dirty="0" smtClean="0">
+                <a:solidFill>
+                  <a:prstClr val="black"/>
+                </a:solidFill>
+                <a:latin typeface="SourceCodePro-Regular"/>
+              </a:rPr>
+              <a:t> </a:t>
+            </a:r>
+            <a:r>
+              <a:rPr lang="nl-NL" dirty="0">
+                <a:solidFill>
+                  <a:prstClr val="black"/>
+                </a:solidFill>
+                <a:latin typeface="SourceCodePro-Regular"/>
+              </a:rPr>
+              <a:t>= </a:t>
+            </a:r>
+            <a:r>
+              <a:rPr lang="nl-NL" dirty="0">
+                <a:solidFill>
+                  <a:srgbClr val="3B5BB5"/>
+                </a:solidFill>
+                <a:latin typeface="SourceCodePro-Regular"/>
+              </a:rPr>
+              <a:t>vld3_u8</a:t>
+            </a:r>
+            <a:r>
+              <a:rPr lang="nl-NL" dirty="0">
+                <a:solidFill>
+                  <a:prstClr val="black"/>
+                </a:solidFill>
+                <a:latin typeface="SourceCodePro-Regular"/>
+              </a:rPr>
+              <a:t>(</a:t>
+            </a:r>
+            <a:r>
+              <a:rPr lang="nl-NL" dirty="0" err="1">
+                <a:solidFill>
+                  <a:prstClr val="black"/>
+                </a:solidFill>
+                <a:latin typeface="SourceCodePro-Regular"/>
+              </a:rPr>
+              <a:t>src</a:t>
+            </a:r>
+            <a:r>
+              <a:rPr lang="nl-NL" dirty="0">
+                <a:solidFill>
+                  <a:prstClr val="black"/>
+                </a:solidFill>
+                <a:latin typeface="SourceCodePro-Regular"/>
+              </a:rPr>
+              <a:t>);</a:t>
+            </a:r>
+            <a:br>
+              <a:rPr lang="nl-NL" dirty="0">
+                <a:solidFill>
+                  <a:prstClr val="black"/>
+                </a:solidFill>
+                <a:latin typeface="SourceCodePro-Regular"/>
+              </a:rPr>
+            </a:br>
+            <a:r>
+              <a:rPr lang="nl-NL" dirty="0">
+                <a:solidFill>
+                  <a:prstClr val="black"/>
+                </a:solidFill>
+                <a:latin typeface="SourceCodePro-Regular"/>
+              </a:rPr>
+              <a:t>    uint16x8_t </a:t>
+            </a:r>
+            <a:r>
+              <a:rPr lang="nl-NL" dirty="0" err="1">
+                <a:solidFill>
+                  <a:prstClr val="black"/>
+                </a:solidFill>
+                <a:latin typeface="SourceCodePro-Regular"/>
+              </a:rPr>
+              <a:t>acc</a:t>
+            </a:r>
+            <a:r>
+              <a:rPr lang="nl-NL" dirty="0">
+                <a:solidFill>
+                  <a:prstClr val="black"/>
+                </a:solidFill>
+                <a:latin typeface="SourceCodePro-Regular"/>
+              </a:rPr>
+              <a:t>;</a:t>
+            </a:r>
+            <a:br>
+              <a:rPr lang="nl-NL" dirty="0">
+                <a:solidFill>
+                  <a:prstClr val="black"/>
+                </a:solidFill>
+                <a:latin typeface="SourceCodePro-Regular"/>
+              </a:rPr>
+            </a:br>
+            <a:r>
+              <a:rPr lang="nl-NL" dirty="0">
+                <a:solidFill>
+                  <a:prstClr val="black"/>
+                </a:solidFill>
+                <a:latin typeface="SourceCodePro-Regular"/>
+              </a:rPr>
+              <a:t>    </a:t>
+            </a:r>
+            <a:br>
+              <a:rPr lang="nl-NL" dirty="0">
+                <a:solidFill>
+                  <a:prstClr val="black"/>
+                </a:solidFill>
+                <a:latin typeface="SourceCodePro-Regular"/>
+              </a:rPr>
+            </a:br>
+            <a:r>
+              <a:rPr lang="nl-NL" dirty="0">
+                <a:solidFill>
+                  <a:prstClr val="black"/>
+                </a:solidFill>
+                <a:latin typeface="SourceCodePro-Regular"/>
+              </a:rPr>
+              <a:t>    </a:t>
+            </a:r>
+            <a:r>
+              <a:rPr lang="nl-NL" dirty="0" err="1">
+                <a:solidFill>
+                  <a:prstClr val="black"/>
+                </a:solidFill>
+                <a:latin typeface="SourceCodePro-Regular"/>
+              </a:rPr>
+              <a:t>acc</a:t>
+            </a:r>
+            <a:r>
+              <a:rPr lang="nl-NL" dirty="0">
+                <a:solidFill>
+                  <a:prstClr val="black"/>
+                </a:solidFill>
+                <a:latin typeface="SourceCodePro-Regular"/>
+              </a:rPr>
+              <a:t> = </a:t>
+            </a:r>
+            <a:r>
+              <a:rPr lang="nl-NL" dirty="0">
+                <a:solidFill>
+                  <a:srgbClr val="3B5BB5"/>
+                </a:solidFill>
+                <a:latin typeface="SourceCodePro-Regular"/>
+              </a:rPr>
+              <a:t>vmull_u8</a:t>
+            </a:r>
+            <a:r>
+              <a:rPr lang="nl-NL" dirty="0">
+                <a:solidFill>
+                  <a:prstClr val="black"/>
+                </a:solidFill>
+                <a:latin typeface="SourceCodePro-Regular"/>
+              </a:rPr>
+              <a:t>(</a:t>
+            </a:r>
+            <a:r>
+              <a:rPr lang="nl-NL" dirty="0" err="1" smtClean="0">
+                <a:solidFill>
+                  <a:prstClr val="black"/>
+                </a:solidFill>
+                <a:latin typeface="SourceCodePro-Regular"/>
+              </a:rPr>
+              <a:t>rgb.val</a:t>
+            </a:r>
+            <a:r>
+              <a:rPr lang="nl-NL" dirty="0">
+                <a:solidFill>
+                  <a:prstClr val="black"/>
+                </a:solidFill>
+                <a:latin typeface="SourceCodePro-Regular"/>
+              </a:rPr>
+              <a:t>[</a:t>
+            </a:r>
+            <a:r>
+              <a:rPr lang="nl-NL" dirty="0">
+                <a:solidFill>
+                  <a:srgbClr val="3B5BB5"/>
+                </a:solidFill>
+                <a:latin typeface="SourceCodePro-Regular"/>
+              </a:rPr>
+              <a:t>0</a:t>
+            </a:r>
+            <a:r>
+              <a:rPr lang="nl-NL" dirty="0">
+                <a:solidFill>
+                  <a:prstClr val="black"/>
+                </a:solidFill>
+                <a:latin typeface="SourceCodePro-Regular"/>
+              </a:rPr>
+              <a:t>], </a:t>
+            </a:r>
+            <a:r>
+              <a:rPr lang="nl-NL" dirty="0" err="1">
+                <a:solidFill>
+                  <a:prstClr val="black"/>
+                </a:solidFill>
+                <a:latin typeface="SourceCodePro-Regular"/>
+              </a:rPr>
+              <a:t>rcoeff</a:t>
+            </a:r>
+            <a:r>
+              <a:rPr lang="nl-NL" dirty="0">
+                <a:solidFill>
+                  <a:prstClr val="black"/>
+                </a:solidFill>
+                <a:latin typeface="SourceCodePro-Regular"/>
+              </a:rPr>
+              <a:t>);</a:t>
+            </a:r>
+            <a:br>
+              <a:rPr lang="nl-NL" dirty="0">
+                <a:solidFill>
+                  <a:prstClr val="black"/>
+                </a:solidFill>
+                <a:latin typeface="SourceCodePro-Regular"/>
+              </a:rPr>
+            </a:br>
+            <a:r>
+              <a:rPr lang="nl-NL" dirty="0">
+                <a:solidFill>
+                  <a:prstClr val="black"/>
+                </a:solidFill>
+                <a:latin typeface="SourceCodePro-Regular"/>
+              </a:rPr>
+              <a:t>    </a:t>
+            </a:r>
+            <a:r>
+              <a:rPr lang="nl-NL" dirty="0" err="1">
+                <a:solidFill>
+                  <a:prstClr val="black"/>
+                </a:solidFill>
+                <a:latin typeface="SourceCodePro-Regular"/>
+              </a:rPr>
+              <a:t>acc</a:t>
+            </a:r>
+            <a:r>
+              <a:rPr lang="nl-NL" dirty="0">
+                <a:solidFill>
+                  <a:prstClr val="black"/>
+                </a:solidFill>
+                <a:latin typeface="SourceCodePro-Regular"/>
+              </a:rPr>
+              <a:t> = </a:t>
+            </a:r>
+            <a:r>
+              <a:rPr lang="nl-NL" dirty="0">
+                <a:solidFill>
+                  <a:srgbClr val="3B5BB5"/>
+                </a:solidFill>
+                <a:latin typeface="SourceCodePro-Regular"/>
+              </a:rPr>
+              <a:t>vmlal_u8</a:t>
+            </a:r>
+            <a:r>
+              <a:rPr lang="nl-NL" dirty="0">
+                <a:solidFill>
+                  <a:prstClr val="black"/>
+                </a:solidFill>
+                <a:latin typeface="SourceCodePro-Regular"/>
+              </a:rPr>
+              <a:t>(</a:t>
+            </a:r>
+            <a:r>
+              <a:rPr lang="nl-NL" dirty="0" err="1">
+                <a:solidFill>
+                  <a:prstClr val="black"/>
+                </a:solidFill>
+                <a:latin typeface="SourceCodePro-Regular"/>
+              </a:rPr>
+              <a:t>acc</a:t>
+            </a:r>
+            <a:r>
+              <a:rPr lang="nl-NL" dirty="0">
+                <a:solidFill>
+                  <a:prstClr val="black"/>
+                </a:solidFill>
+                <a:latin typeface="SourceCodePro-Regular"/>
+              </a:rPr>
+              <a:t>, </a:t>
+            </a:r>
+            <a:r>
+              <a:rPr lang="nl-NL" dirty="0" err="1" smtClean="0">
+                <a:solidFill>
+                  <a:prstClr val="black"/>
+                </a:solidFill>
+                <a:latin typeface="SourceCodePro-Regular"/>
+              </a:rPr>
+              <a:t>rgb.val</a:t>
+            </a:r>
+            <a:r>
+              <a:rPr lang="nl-NL" dirty="0">
+                <a:solidFill>
+                  <a:prstClr val="black"/>
+                </a:solidFill>
+                <a:latin typeface="SourceCodePro-Regular"/>
+              </a:rPr>
+              <a:t>[</a:t>
+            </a:r>
+            <a:r>
+              <a:rPr lang="nl-NL" dirty="0">
+                <a:solidFill>
+                  <a:srgbClr val="3B5BB5"/>
+                </a:solidFill>
+                <a:latin typeface="SourceCodePro-Regular"/>
+              </a:rPr>
+              <a:t>1</a:t>
+            </a:r>
+            <a:r>
+              <a:rPr lang="nl-NL" dirty="0">
+                <a:solidFill>
+                  <a:prstClr val="black"/>
+                </a:solidFill>
+                <a:latin typeface="SourceCodePro-Regular"/>
+              </a:rPr>
+              <a:t>], </a:t>
+            </a:r>
+            <a:r>
+              <a:rPr lang="nl-NL" dirty="0" err="1">
+                <a:solidFill>
+                  <a:prstClr val="black"/>
+                </a:solidFill>
+                <a:latin typeface="SourceCodePro-Regular"/>
+              </a:rPr>
+              <a:t>gcoeff</a:t>
+            </a:r>
+            <a:r>
+              <a:rPr lang="nl-NL" dirty="0">
+                <a:solidFill>
+                  <a:prstClr val="black"/>
+                </a:solidFill>
+                <a:latin typeface="SourceCodePro-Regular"/>
+              </a:rPr>
+              <a:t>);</a:t>
+            </a:r>
+            <a:br>
+              <a:rPr lang="nl-NL" dirty="0">
+                <a:solidFill>
+                  <a:prstClr val="black"/>
+                </a:solidFill>
+                <a:latin typeface="SourceCodePro-Regular"/>
+              </a:rPr>
+            </a:br>
+            <a:r>
+              <a:rPr lang="nl-NL" dirty="0">
+                <a:solidFill>
+                  <a:prstClr val="black"/>
+                </a:solidFill>
+                <a:latin typeface="SourceCodePro-Regular"/>
+              </a:rPr>
+              <a:t>    </a:t>
+            </a:r>
+            <a:r>
+              <a:rPr lang="nl-NL" dirty="0" err="1">
+                <a:solidFill>
+                  <a:prstClr val="black"/>
+                </a:solidFill>
+                <a:latin typeface="SourceCodePro-Regular"/>
+              </a:rPr>
+              <a:t>acc</a:t>
+            </a:r>
+            <a:r>
+              <a:rPr lang="nl-NL" dirty="0">
+                <a:solidFill>
+                  <a:prstClr val="black"/>
+                </a:solidFill>
+                <a:latin typeface="SourceCodePro-Regular"/>
+              </a:rPr>
+              <a:t> = </a:t>
+            </a:r>
+            <a:r>
+              <a:rPr lang="nl-NL" dirty="0">
+                <a:solidFill>
+                  <a:srgbClr val="3B5BB5"/>
+                </a:solidFill>
+                <a:latin typeface="SourceCodePro-Regular"/>
+              </a:rPr>
+              <a:t>vmlal_u8</a:t>
+            </a:r>
+            <a:r>
+              <a:rPr lang="nl-NL" dirty="0">
+                <a:solidFill>
+                  <a:prstClr val="black"/>
+                </a:solidFill>
+                <a:latin typeface="SourceCodePro-Regular"/>
+              </a:rPr>
+              <a:t>(</a:t>
+            </a:r>
+            <a:r>
+              <a:rPr lang="nl-NL" dirty="0" err="1">
+                <a:solidFill>
+                  <a:prstClr val="black"/>
+                </a:solidFill>
+                <a:latin typeface="SourceCodePro-Regular"/>
+              </a:rPr>
+              <a:t>acc</a:t>
+            </a:r>
+            <a:r>
+              <a:rPr lang="nl-NL" dirty="0">
+                <a:solidFill>
+                  <a:prstClr val="black"/>
+                </a:solidFill>
+                <a:latin typeface="SourceCodePro-Regular"/>
+              </a:rPr>
+              <a:t>, </a:t>
+            </a:r>
+            <a:r>
+              <a:rPr lang="nl-NL" dirty="0" err="1" smtClean="0">
+                <a:solidFill>
+                  <a:prstClr val="black"/>
+                </a:solidFill>
+                <a:latin typeface="SourceCodePro-Regular"/>
+              </a:rPr>
+              <a:t>rgb.val</a:t>
+            </a:r>
+            <a:r>
+              <a:rPr lang="nl-NL" dirty="0">
+                <a:solidFill>
+                  <a:prstClr val="black"/>
+                </a:solidFill>
+                <a:latin typeface="SourceCodePro-Regular"/>
+              </a:rPr>
+              <a:t>[</a:t>
+            </a:r>
+            <a:r>
+              <a:rPr lang="nl-NL" dirty="0">
+                <a:solidFill>
+                  <a:srgbClr val="3B5BB5"/>
+                </a:solidFill>
+                <a:latin typeface="SourceCodePro-Regular"/>
+              </a:rPr>
+              <a:t>2</a:t>
+            </a:r>
+            <a:r>
+              <a:rPr lang="nl-NL" dirty="0">
+                <a:solidFill>
+                  <a:prstClr val="black"/>
+                </a:solidFill>
+                <a:latin typeface="SourceCodePro-Regular"/>
+              </a:rPr>
+              <a:t>], </a:t>
+            </a:r>
+            <a:r>
+              <a:rPr lang="nl-NL" dirty="0" err="1">
+                <a:solidFill>
+                  <a:prstClr val="black"/>
+                </a:solidFill>
+                <a:latin typeface="SourceCodePro-Regular"/>
+              </a:rPr>
+              <a:t>bcoeff</a:t>
+            </a:r>
+            <a:r>
+              <a:rPr lang="nl-NL" dirty="0">
+                <a:solidFill>
+                  <a:prstClr val="black"/>
+                </a:solidFill>
+                <a:latin typeface="SourceCodePro-Regular"/>
+              </a:rPr>
+              <a:t>);</a:t>
+            </a:r>
+            <a:br>
+              <a:rPr lang="nl-NL" dirty="0">
+                <a:solidFill>
+                  <a:prstClr val="black"/>
+                </a:solidFill>
+                <a:latin typeface="SourceCodePro-Regular"/>
+              </a:rPr>
+            </a:br>
+            <a:r>
+              <a:rPr lang="nl-NL" dirty="0">
+                <a:solidFill>
+                  <a:prstClr val="black"/>
+                </a:solidFill>
+                <a:latin typeface="SourceCodePro-Regular"/>
+              </a:rPr>
+              <a:t>    </a:t>
+            </a:r>
+            <a:br>
+              <a:rPr lang="nl-NL" dirty="0">
+                <a:solidFill>
+                  <a:prstClr val="black"/>
+                </a:solidFill>
+                <a:latin typeface="SourceCodePro-Regular"/>
+              </a:rPr>
+            </a:br>
+            <a:r>
+              <a:rPr lang="nl-NL" dirty="0">
+                <a:solidFill>
+                  <a:prstClr val="black"/>
+                </a:solidFill>
+                <a:latin typeface="SourceCodePro-Regular"/>
+              </a:rPr>
+              <a:t>    uint8x8_t </a:t>
+            </a:r>
+            <a:r>
+              <a:rPr lang="nl-NL" dirty="0" err="1">
+                <a:solidFill>
+                  <a:prstClr val="black"/>
+                </a:solidFill>
+                <a:latin typeface="SourceCodePro-Regular"/>
+              </a:rPr>
+              <a:t>result</a:t>
+            </a:r>
+            <a:r>
+              <a:rPr lang="nl-NL" dirty="0">
+                <a:solidFill>
+                  <a:prstClr val="black"/>
+                </a:solidFill>
+                <a:latin typeface="SourceCodePro-Regular"/>
+              </a:rPr>
+              <a:t> = </a:t>
+            </a:r>
+            <a:r>
+              <a:rPr lang="nl-NL" dirty="0">
+                <a:solidFill>
+                  <a:srgbClr val="3B5BB5"/>
+                </a:solidFill>
+                <a:latin typeface="SourceCodePro-Regular"/>
+              </a:rPr>
+              <a:t>vshrn_n_u16</a:t>
+            </a:r>
+            <a:r>
+              <a:rPr lang="nl-NL" dirty="0">
+                <a:solidFill>
+                  <a:prstClr val="black"/>
+                </a:solidFill>
+                <a:latin typeface="SourceCodePro-Regular"/>
+              </a:rPr>
+              <a:t>(</a:t>
+            </a:r>
+            <a:r>
+              <a:rPr lang="nl-NL" dirty="0" err="1">
+                <a:solidFill>
+                  <a:prstClr val="black"/>
+                </a:solidFill>
+                <a:latin typeface="SourceCodePro-Regular"/>
+              </a:rPr>
+              <a:t>acc</a:t>
+            </a:r>
+            <a:r>
+              <a:rPr lang="nl-NL" dirty="0">
+                <a:solidFill>
+                  <a:prstClr val="black"/>
+                </a:solidFill>
+                <a:latin typeface="SourceCodePro-Regular"/>
+              </a:rPr>
+              <a:t>, </a:t>
+            </a:r>
+            <a:r>
+              <a:rPr lang="nl-NL" dirty="0">
+                <a:solidFill>
+                  <a:srgbClr val="3B5BB5"/>
+                </a:solidFill>
+                <a:latin typeface="SourceCodePro-Regular"/>
+              </a:rPr>
+              <a:t>8</a:t>
+            </a:r>
+            <a:r>
+              <a:rPr lang="nl-NL" dirty="0">
+                <a:solidFill>
+                  <a:prstClr val="black"/>
+                </a:solidFill>
+                <a:latin typeface="SourceCodePro-Regular"/>
+              </a:rPr>
+              <a:t>);</a:t>
+            </a:r>
+            <a:br>
+              <a:rPr lang="nl-NL" dirty="0">
+                <a:solidFill>
+                  <a:prstClr val="black"/>
+                </a:solidFill>
+                <a:latin typeface="SourceCodePro-Regular"/>
+              </a:rPr>
+            </a:br>
+            <a:r>
+              <a:rPr lang="nl-NL" dirty="0">
+                <a:solidFill>
+                  <a:prstClr val="black"/>
+                </a:solidFill>
+                <a:latin typeface="SourceCodePro-Regular"/>
+              </a:rPr>
+              <a:t>    </a:t>
+            </a:r>
+            <a:r>
+              <a:rPr lang="nl-NL" dirty="0">
+                <a:solidFill>
+                  <a:srgbClr val="3B5BB5"/>
+                </a:solidFill>
+                <a:latin typeface="SourceCodePro-Regular"/>
+              </a:rPr>
+              <a:t>vst1_u8</a:t>
+            </a:r>
+            <a:r>
+              <a:rPr lang="nl-NL" dirty="0">
+                <a:solidFill>
+                  <a:prstClr val="black"/>
+                </a:solidFill>
+                <a:latin typeface="SourceCodePro-Regular"/>
+              </a:rPr>
+              <a:t>(</a:t>
+            </a:r>
+            <a:r>
+              <a:rPr lang="nl-NL" dirty="0" err="1">
+                <a:solidFill>
+                  <a:prstClr val="black"/>
+                </a:solidFill>
+                <a:latin typeface="SourceCodePro-Regular"/>
+              </a:rPr>
+              <a:t>dest</a:t>
+            </a:r>
+            <a:r>
+              <a:rPr lang="nl-NL" dirty="0">
+                <a:solidFill>
+                  <a:prstClr val="black"/>
+                </a:solidFill>
+                <a:latin typeface="SourceCodePro-Regular"/>
+              </a:rPr>
+              <a:t>, </a:t>
+            </a:r>
+            <a:r>
+              <a:rPr lang="nl-NL" dirty="0" err="1">
+                <a:solidFill>
+                  <a:prstClr val="black"/>
+                </a:solidFill>
+                <a:latin typeface="SourceCodePro-Regular"/>
+              </a:rPr>
+              <a:t>result</a:t>
+            </a:r>
+            <a:r>
+              <a:rPr lang="nl-NL" dirty="0">
+                <a:solidFill>
+                  <a:prstClr val="black"/>
+                </a:solidFill>
+                <a:latin typeface="SourceCodePro-Regular"/>
+              </a:rPr>
+              <a:t>);</a:t>
+            </a:r>
+            <a:br>
+              <a:rPr lang="nl-NL" dirty="0">
+                <a:solidFill>
+                  <a:prstClr val="black"/>
+                </a:solidFill>
+                <a:latin typeface="SourceCodePro-Regular"/>
+              </a:rPr>
+            </a:br>
+            <a:r>
+              <a:rPr lang="nl-NL" dirty="0">
+                <a:solidFill>
+                  <a:prstClr val="black"/>
+                </a:solidFill>
+                <a:latin typeface="SourceCodePro-Regular"/>
+              </a:rPr>
+              <a:t>       </a:t>
+            </a:r>
+            <a:br>
+              <a:rPr lang="nl-NL" dirty="0">
+                <a:solidFill>
+                  <a:prstClr val="black"/>
+                </a:solidFill>
+                <a:latin typeface="SourceCodePro-Regular"/>
+              </a:rPr>
+            </a:br>
+            <a:r>
+              <a:rPr lang="nl-NL" dirty="0">
+                <a:solidFill>
+                  <a:prstClr val="black"/>
+                </a:solidFill>
+                <a:latin typeface="SourceCodePro-Regular"/>
+              </a:rPr>
+              <a:t>    </a:t>
+            </a:r>
+            <a:r>
+              <a:rPr lang="nl-NL" dirty="0" err="1">
+                <a:solidFill>
+                  <a:prstClr val="black"/>
+                </a:solidFill>
+                <a:latin typeface="SourceCodePro-Regular"/>
+              </a:rPr>
+              <a:t>src</a:t>
+            </a:r>
+            <a:r>
+              <a:rPr lang="nl-NL" dirty="0">
+                <a:solidFill>
+                  <a:prstClr val="black"/>
+                </a:solidFill>
+                <a:latin typeface="SourceCodePro-Regular"/>
+              </a:rPr>
+              <a:t> += FACTOR;</a:t>
+            </a:r>
+            <a:br>
+              <a:rPr lang="nl-NL" dirty="0">
+                <a:solidFill>
+                  <a:prstClr val="black"/>
+                </a:solidFill>
+                <a:latin typeface="SourceCodePro-Regular"/>
+              </a:rPr>
+            </a:br>
+            <a:r>
+              <a:rPr lang="nl-NL" dirty="0">
+                <a:solidFill>
+                  <a:prstClr val="black"/>
+                </a:solidFill>
+                <a:latin typeface="SourceCodePro-Regular"/>
+              </a:rPr>
+              <a:t>    </a:t>
+            </a:r>
+            <a:r>
+              <a:rPr lang="nl-NL" dirty="0" err="1">
+                <a:solidFill>
+                  <a:prstClr val="black"/>
+                </a:solidFill>
+                <a:latin typeface="SourceCodePro-Regular"/>
+              </a:rPr>
+              <a:t>dest</a:t>
+            </a:r>
+            <a:r>
+              <a:rPr lang="nl-NL" dirty="0">
+                <a:solidFill>
+                  <a:prstClr val="black"/>
+                </a:solidFill>
+                <a:latin typeface="SourceCodePro-Regular"/>
+              </a:rPr>
+              <a:t> += FACTOR;</a:t>
+            </a:r>
+            <a:br>
+              <a:rPr lang="nl-NL" dirty="0">
+                <a:solidFill>
+                  <a:prstClr val="black"/>
+                </a:solidFill>
+                <a:latin typeface="SourceCodePro-Regular"/>
+              </a:rPr>
+            </a:br>
+            <a:r>
+              <a:rPr lang="nl-NL" dirty="0">
+                <a:solidFill>
+                  <a:prstClr val="black"/>
+                </a:solidFill>
+                <a:latin typeface="SourceCodePro-Regular"/>
+              </a:rPr>
+              <a:t>}</a:t>
+            </a:r>
+            <a:endParaRPr lang="en-US" dirty="0">
+              <a:latin typeface="HelveticaNeueLT Com 45 Lt"/>
+            </a:endParaRPr>
+          </a:p>
+        </p:txBody>
+      </p:sp>
       <p:sp>
         <p:nvSpPr>
           <p:cNvPr id="5" name="Rounded Rectangle 4"/>
@@ -11166,7 +11399,7 @@
 </p:sld>
 </file>
 
-<file path=ppt/slides/slide21.xml><?xml version="1.0" encoding="utf-8"?>
+<file path=ppt/slides/slide22.xml><?xml version="1.0" encoding="utf-8"?>
 <p:sld xmlns:a="http://schemas.openxmlformats.org/drawingml/2006/main" xmlns:r="http://schemas.openxmlformats.org/officeDocument/2006/relationships" xmlns:p="http://schemas.openxmlformats.org/presentationml/2006/main">
   <p:cSld>
     <p:spTree>
@@ -11238,7 +11471,7 @@
           <a:p>
             <a:fld id="{0A3E316F-3D65-2744-BC5B-55B8D60FFFDF}" type="slidenum">
               <a:rPr lang="en-US" smtClean="0"/>
-              <a:t>21</a:t>
+              <a:t>22</a:t>
             </a:fld>
             <a:endParaRPr lang="en-US"/>
           </a:p>
@@ -12268,7 +12501,7 @@
 </p:sld>
 </file>
 
-<file path=ppt/slides/slide22.xml><?xml version="1.0" encoding="utf-8"?>
+<file path=ppt/slides/slide23.xml><?xml version="1.0" encoding="utf-8"?>
 <p:sld xmlns:a="http://schemas.openxmlformats.org/drawingml/2006/main" xmlns:r="http://schemas.openxmlformats.org/officeDocument/2006/relationships" xmlns:p="http://schemas.openxmlformats.org/presentationml/2006/main">
   <p:cSld>
     <p:spTree>
@@ -12340,7 +12573,7 @@
           <a:p>
             <a:fld id="{0A3E316F-3D65-2744-BC5B-55B8D60FFFDF}" type="slidenum">
               <a:rPr lang="en-US" smtClean="0"/>
-              <a:t>22</a:t>
+              <a:t>23</a:t>
             </a:fld>
             <a:endParaRPr lang="en-US"/>
           </a:p>
@@ -13290,7 +13523,7 @@
 </p:sld>
 </file>
 
-<file path=ppt/slides/slide23.xml><?xml version="1.0" encoding="utf-8"?>
+<file path=ppt/slides/slide24.xml><?xml version="1.0" encoding="utf-8"?>
 <p:sld xmlns:a="http://schemas.openxmlformats.org/drawingml/2006/main" xmlns:r="http://schemas.openxmlformats.org/officeDocument/2006/relationships" xmlns:p="http://schemas.openxmlformats.org/presentationml/2006/main">
   <p:cSld>
     <p:spTree>
@@ -13372,7 +13605,7 @@
           <a:p>
             <a:fld id="{0A3E316F-3D65-2744-BC5B-55B8D60FFFDF}" type="slidenum">
               <a:rPr lang="en-US" smtClean="0"/>
-              <a:t>23</a:t>
+              <a:t>24</a:t>
             </a:fld>
             <a:endParaRPr lang="en-US"/>
           </a:p>
@@ -14348,7 +14581,7 @@
 </p:sld>
 </file>
 
-<file path=ppt/slides/slide24.xml><?xml version="1.0" encoding="utf-8"?>
+<file path=ppt/slides/slide25.xml><?xml version="1.0" encoding="utf-8"?>
 <p:sld xmlns:a="http://schemas.openxmlformats.org/drawingml/2006/main" xmlns:r="http://schemas.openxmlformats.org/officeDocument/2006/relationships" xmlns:p="http://schemas.openxmlformats.org/presentationml/2006/main">
   <p:cSld>
     <p:spTree>
@@ -14430,7 +14663,7 @@
           <a:p>
             <a:fld id="{0A3E316F-3D65-2744-BC5B-55B8D60FFFDF}" type="slidenum">
               <a:rPr lang="en-US" smtClean="0"/>
-              <a:t>24</a:t>
+              <a:t>25</a:t>
             </a:fld>
             <a:endParaRPr lang="en-US"/>
           </a:p>
@@ -15449,167 +15682,6 @@
 </p:sld>
 </file>
 
-<file path=ppt/slides/slide25.xml><?xml version="1.0" encoding="utf-8"?>
-<p:sld xmlns:a="http://schemas.openxmlformats.org/drawingml/2006/main" xmlns:r="http://schemas.openxmlformats.org/officeDocument/2006/relationships" xmlns:p="http://schemas.openxmlformats.org/presentationml/2006/main">
-  <p:cSld>
-    <p:spTree>
-      <p:nvGrpSpPr>
-        <p:cNvPr id="1" name=""/>
-        <p:cNvGrpSpPr/>
-        <p:nvPr/>
-      </p:nvGrpSpPr>
-      <p:grpSpPr>
-        <a:xfrm>
-          <a:off x="0" y="0"/>
-          <a:ext cx="0" cy="0"/>
-          <a:chOff x="0" y="0"/>
-          <a:chExt cx="0" cy="0"/>
-        </a:xfrm>
-      </p:grpSpPr>
-      <p:sp>
-        <p:nvSpPr>
-          <p:cNvPr id="2" name="Title 1"/>
-          <p:cNvSpPr>
-            <a:spLocks noGrp="1"/>
-          </p:cNvSpPr>
-          <p:nvPr>
-            <p:ph type="title"/>
-          </p:nvPr>
-        </p:nvSpPr>
-        <p:spPr/>
-        <p:txBody>
-          <a:bodyPr>
-            <a:normAutofit fontScale="90000"/>
-          </a:bodyPr>
-          <a:lstStyle/>
-          <a:p>
-            <a:r>
-              <a:rPr lang="en-US" dirty="0" smtClean="0"/>
-              <a:t>Single Instruction – Multiple data</a:t>
-            </a:r>
-            <a:br>
-              <a:rPr lang="en-US" dirty="0" smtClean="0"/>
-            </a:br>
-            <a:r>
-              <a:rPr lang="en-US" sz="2800" dirty="0" smtClean="0">
-                <a:solidFill>
-                  <a:schemeClr val="bg1">
-                    <a:lumMod val="50000"/>
-                  </a:schemeClr>
-                </a:solidFill>
-              </a:rPr>
-              <a:t>Converting to </a:t>
-            </a:r>
-            <a:r>
-              <a:rPr lang="en-US" sz="2800" dirty="0" err="1" smtClean="0">
-                <a:solidFill>
-                  <a:schemeClr val="bg1">
-                    <a:lumMod val="50000"/>
-                  </a:schemeClr>
-                </a:solidFill>
-              </a:rPr>
-              <a:t>grayscale</a:t>
-            </a:r>
-            <a:endParaRPr lang="en-US" dirty="0"/>
-          </a:p>
-        </p:txBody>
-      </p:sp>
-      <p:sp>
-        <p:nvSpPr>
-          <p:cNvPr id="7" name="Content Placeholder 6"/>
-          <p:cNvSpPr>
-            <a:spLocks noGrp="1"/>
-          </p:cNvSpPr>
-          <p:nvPr>
-            <p:ph idx="1"/>
-          </p:nvPr>
-        </p:nvSpPr>
-        <p:spPr/>
-        <p:txBody>
-          <a:bodyPr/>
-          <a:lstStyle/>
-          <a:p>
-            <a:r>
-              <a:rPr lang="en-US" dirty="0" smtClean="0"/>
-              <a:t>Native C-Version</a:t>
-            </a:r>
-          </a:p>
-          <a:p>
-            <a:pPr lvl="1"/>
-            <a:r>
-              <a:rPr lang="en-US" dirty="0" smtClean="0"/>
-              <a:t>16 Instructions / Pixel</a:t>
-            </a:r>
-          </a:p>
-          <a:p>
-            <a:pPr lvl="1"/>
-            <a:endParaRPr lang="en-US" dirty="0" smtClean="0"/>
-          </a:p>
-          <a:p>
-            <a:r>
-              <a:rPr lang="en-US" dirty="0" smtClean="0"/>
-              <a:t>SIMD Version:</a:t>
-            </a:r>
-          </a:p>
-          <a:p>
-            <a:pPr lvl="1"/>
-            <a:r>
-              <a:rPr lang="en-US" dirty="0" smtClean="0"/>
-              <a:t>15 Instructions / 8 Pixels</a:t>
-            </a:r>
-          </a:p>
-          <a:p>
-            <a:pPr lvl="1"/>
-            <a:r>
-              <a:rPr lang="en-US" dirty="0" smtClean="0"/>
-              <a:t>~2 Instructions / Pixel</a:t>
-            </a:r>
-          </a:p>
-        </p:txBody>
-      </p:sp>
-      <p:sp>
-        <p:nvSpPr>
-          <p:cNvPr id="4" name="Slide Number Placeholder 3"/>
-          <p:cNvSpPr>
-            <a:spLocks noGrp="1"/>
-          </p:cNvSpPr>
-          <p:nvPr>
-            <p:ph type="sldNum" sz="quarter" idx="12"/>
-          </p:nvPr>
-        </p:nvSpPr>
-        <p:spPr/>
-        <p:txBody>
-          <a:bodyPr/>
-          <a:lstStyle/>
-          <a:p>
-            <a:fld id="{0A3E316F-3D65-2744-BC5B-55B8D60FFFDF}" type="slidenum">
-              <a:rPr lang="en-US" smtClean="0"/>
-              <a:t>25</a:t>
-            </a:fld>
-            <a:endParaRPr lang="en-US"/>
-          </a:p>
-        </p:txBody>
-      </p:sp>
-    </p:spTree>
-    <p:extLst>
-      <p:ext uri="{BB962C8B-B14F-4D97-AF65-F5344CB8AC3E}">
-        <p14:creationId xmlns:p14="http://schemas.microsoft.com/office/powerpoint/2010/main" val="3608574956"/>
-      </p:ext>
-    </p:extLst>
-  </p:cSld>
-  <p:clrMapOvr>
-    <a:masterClrMapping/>
-  </p:clrMapOvr>
-  <p:timing>
-    <p:tnLst>
-      <p:par>
-        <p:cTn xmlns:p14="http://schemas.microsoft.com/office/powerpoint/2010/main" id="1" dur="indefinite" restart="never" nodeType="tmRoot"/>
-      </p:par>
-    </p:tnLst>
-  </p:timing>
-</p:sld>
-</file>
-
 <file path=ppt/slides/slide26.xml><?xml version="1.0" encoding="utf-8"?>
 <p:sld xmlns:a="http://schemas.openxmlformats.org/drawingml/2006/main" xmlns:r="http://schemas.openxmlformats.org/officeDocument/2006/relationships" xmlns:p="http://schemas.openxmlformats.org/presentationml/2006/main">
   <p:cSld>
@@ -15639,12 +15711,37 @@
         </p:nvSpPr>
         <p:spPr/>
         <p:txBody>
-          <a:bodyPr/>
+          <a:bodyPr>
+            <a:normAutofit fontScale="90000"/>
+          </a:bodyPr>
           <a:lstStyle/>
           <a:p>
             <a:r>
               <a:rPr lang="en-US" dirty="0" smtClean="0"/>
-              <a:t>Google Go</a:t>
+              <a:t>Single Instruction – Multiple data</a:t>
+            </a:r>
+            <a:br>
+              <a:rPr lang="en-US" dirty="0" smtClean="0"/>
+            </a:br>
+            <a:r>
+              <a:rPr lang="en-US" sz="2800" dirty="0" smtClean="0">
+                <a:solidFill>
+                  <a:schemeClr val="bg1">
+                    <a:lumMod val="50000"/>
+                  </a:schemeClr>
+                </a:solidFill>
+              </a:rPr>
+              <a:t>Converting to </a:t>
+            </a:r>
+            <a:r>
+              <a:rPr lang="en-US" sz="2800" dirty="0" err="1" smtClean="0">
+                <a:solidFill>
+                  <a:schemeClr val="bg1">
+                    <a:lumMod val="50000"/>
+                  </a:schemeClr>
+                </a:solidFill>
+              </a:rPr>
+              <a:t>grayscale</a:t>
             </a:r>
             <a:endParaRPr lang="en-US" dirty="0"/>
           </a:p>
@@ -15652,7 +15749,7 @@
       </p:sp>
       <p:sp>
         <p:nvSpPr>
-          <p:cNvPr id="3" name="Content Placeholder 2"/>
+          <p:cNvPr id="7" name="Content Placeholder 6"/>
           <p:cNvSpPr>
             <a:spLocks noGrp="1"/>
           </p:cNvSpPr>
@@ -15665,7 +15762,41 @@
           <a:bodyPr/>
           <a:lstStyle/>
           <a:p>
-            <a:endParaRPr lang="en-US"/>
+            <a:r>
+              <a:rPr lang="en-US" dirty="0" smtClean="0"/>
+              <a:t>Native C-Version</a:t>
+            </a:r>
+          </a:p>
+          <a:p>
+            <a:pPr lvl="1"/>
+            <a:r>
+              <a:rPr lang="en-US" dirty="0" smtClean="0"/>
+              <a:t>16 Instructions / Pixel</a:t>
+            </a:r>
+          </a:p>
+          <a:p>
+            <a:pPr lvl="1"/>
+            <a:endParaRPr lang="en-US" dirty="0" smtClean="0"/>
+          </a:p>
+          <a:p>
+            <a:r>
+              <a:rPr lang="en-US" dirty="0" smtClean="0"/>
+              <a:t>SIMD Version:</a:t>
+            </a:r>
+          </a:p>
+          <a:p>
+            <a:pPr lvl="1"/>
+            <a:r>
+              <a:rPr lang="en-US" dirty="0" smtClean="0"/>
+              <a:t>15 Instructions / 8 Pixels</a:t>
+            </a:r>
+          </a:p>
+          <a:p>
+            <a:pPr lvl="1"/>
+            <a:r>
+              <a:rPr lang="en-US" dirty="0" smtClean="0"/>
+              <a:t>~2 Instructions / Pixel</a:t>
+            </a:r>
           </a:p>
         </p:txBody>
       </p:sp>
@@ -15695,7 +15826,7 @@
     </p:spTree>
     <p:extLst>
       <p:ext uri="{BB962C8B-B14F-4D97-AF65-F5344CB8AC3E}">
-        <p14:creationId xmlns:p14="http://schemas.microsoft.com/office/powerpoint/2010/main" val="1196601780"/>
+        <p14:creationId xmlns:p14="http://schemas.microsoft.com/office/powerpoint/2010/main" val="3608574956"/>
       </p:ext>
     </p:extLst>
   </p:cSld>
@@ -15746,7 +15877,7 @@
           <a:p>
             <a:r>
               <a:rPr lang="en-US" dirty="0" smtClean="0"/>
-              <a:t>Evaluation</a:t>
+              <a:t>Google Go</a:t>
             </a:r>
             <a:endParaRPr lang="en-US" dirty="0"/>
           </a:p>
@@ -15797,7 +15928,7 @@
     </p:spTree>
     <p:extLst>
       <p:ext uri="{BB962C8B-B14F-4D97-AF65-F5344CB8AC3E}">
-        <p14:creationId xmlns:p14="http://schemas.microsoft.com/office/powerpoint/2010/main" val="562772578"/>
+        <p14:creationId xmlns:p14="http://schemas.microsoft.com/office/powerpoint/2010/main" val="1196601780"/>
       </p:ext>
     </p:extLst>
   </p:cSld>
@@ -15838,6 +15969,108 @@
             <a:spLocks noGrp="1"/>
           </p:cNvSpPr>
           <p:nvPr>
+            <p:ph type="title"/>
+          </p:nvPr>
+        </p:nvSpPr>
+        <p:spPr/>
+        <p:txBody>
+          <a:bodyPr/>
+          <a:lstStyle/>
+          <a:p>
+            <a:r>
+              <a:rPr lang="en-US" dirty="0" smtClean="0"/>
+              <a:t>Evaluation</a:t>
+            </a:r>
+            <a:endParaRPr lang="en-US" dirty="0"/>
+          </a:p>
+        </p:txBody>
+      </p:sp>
+      <p:sp>
+        <p:nvSpPr>
+          <p:cNvPr id="3" name="Content Placeholder 2"/>
+          <p:cNvSpPr>
+            <a:spLocks noGrp="1"/>
+          </p:cNvSpPr>
+          <p:nvPr>
+            <p:ph idx="1"/>
+          </p:nvPr>
+        </p:nvSpPr>
+        <p:spPr/>
+        <p:txBody>
+          <a:bodyPr/>
+          <a:lstStyle/>
+          <a:p>
+            <a:endParaRPr lang="en-US"/>
+          </a:p>
+        </p:txBody>
+      </p:sp>
+      <p:sp>
+        <p:nvSpPr>
+          <p:cNvPr id="4" name="Slide Number Placeholder 3"/>
+          <p:cNvSpPr>
+            <a:spLocks noGrp="1"/>
+          </p:cNvSpPr>
+          <p:nvPr>
+            <p:ph type="sldNum" sz="quarter" idx="12"/>
+          </p:nvPr>
+        </p:nvSpPr>
+        <p:spPr/>
+        <p:txBody>
+          <a:bodyPr/>
+          <a:lstStyle/>
+          <a:p>
+            <a:fld id="{0A3E316F-3D65-2744-BC5B-55B8D60FFFDF}" type="slidenum">
+              <a:rPr lang="en-US" smtClean="0"/>
+              <a:t>28</a:t>
+            </a:fld>
+            <a:endParaRPr lang="en-US"/>
+          </a:p>
+        </p:txBody>
+      </p:sp>
+    </p:spTree>
+    <p:extLst>
+      <p:ext uri="{BB962C8B-B14F-4D97-AF65-F5344CB8AC3E}">
+        <p14:creationId xmlns:p14="http://schemas.microsoft.com/office/powerpoint/2010/main" val="562772578"/>
+      </p:ext>
+    </p:extLst>
+  </p:cSld>
+  <p:clrMapOvr>
+    <a:masterClrMapping/>
+  </p:clrMapOvr>
+  <p:timing>
+    <p:tnLst>
+      <p:par>
+        <p:cTn xmlns:p14="http://schemas.microsoft.com/office/powerpoint/2010/main" id="1" dur="indefinite" restart="never" nodeType="tmRoot"/>
+      </p:par>
+    </p:tnLst>
+  </p:timing>
+</p:sld>
+</file>
+
+<file path=ppt/slides/slide29.xml><?xml version="1.0" encoding="utf-8"?>
+<p:sld xmlns:a="http://schemas.openxmlformats.org/drawingml/2006/main" xmlns:r="http://schemas.openxmlformats.org/officeDocument/2006/relationships" xmlns:p="http://schemas.openxmlformats.org/presentationml/2006/main">
+  <p:cSld>
+    <p:spTree>
+      <p:nvGrpSpPr>
+        <p:cNvPr id="1" name=""/>
+        <p:cNvGrpSpPr/>
+        <p:nvPr/>
+      </p:nvGrpSpPr>
+      <p:grpSpPr>
+        <a:xfrm>
+          <a:off x="0" y="0"/>
+          <a:ext cx="0" cy="0"/>
+          <a:chOff x="0" y="0"/>
+          <a:chExt cx="0" cy="0"/>
+        </a:xfrm>
+      </p:grpSpPr>
+      <p:sp>
+        <p:nvSpPr>
+          <p:cNvPr id="2" name="Title 1"/>
+          <p:cNvSpPr>
+            <a:spLocks noGrp="1"/>
+          </p:cNvSpPr>
+          <p:nvPr>
             <p:ph type="ctrTitle"/>
           </p:nvPr>
         </p:nvSpPr>
@@ -15894,7 +16127,7 @@
           <a:p>
             <a:fld id="{0A3E316F-3D65-2744-BC5B-55B8D60FFFDF}" type="slidenum">
               <a:rPr lang="en-US" smtClean="0"/>
-              <a:t>28</a:t>
+              <a:t>29</a:t>
             </a:fld>
             <a:endParaRPr lang="en-US"/>
           </a:p>
@@ -16281,8 +16514,8 @@
         </p:blipFill>
         <p:spPr>
           <a:xfrm>
-            <a:off x="3333853" y="4479389"/>
-            <a:ext cx="2315294" cy="2772988"/>
+            <a:off x="3598969" y="5080414"/>
+            <a:ext cx="1785062" cy="2137938"/>
           </a:xfrm>
           <a:prstGeom prst="rect">
             <a:avLst/>
@@ -16305,12 +16538,14 @@
         </p:nvSpPr>
         <p:spPr/>
         <p:txBody>
-          <a:bodyPr/>
+          <a:bodyPr>
+            <a:normAutofit/>
+          </a:bodyPr>
           <a:lstStyle/>
           <a:p>
             <a:r>
-              <a:rPr lang="en-US" dirty="0" err="1" smtClean="0"/>
-              <a:t>Laserscanner</a:t>
+              <a:rPr lang="en-US" dirty="0" smtClean="0"/>
+              <a:t>Obstacle Detection</a:t>
             </a:r>
             <a:endParaRPr lang="en-US" dirty="0"/>
           </a:p>
@@ -16328,8 +16563,8 @@
         </p:nvSpPr>
         <p:spPr>
           <a:xfrm>
-            <a:off x="2493963" y="1416357"/>
-            <a:ext cx="6192837" cy="4893648"/>
+            <a:off x="2493963" y="1457766"/>
+            <a:ext cx="6399229" cy="3268587"/>
           </a:xfrm>
           <a:prstGeom prst="rect">
             <a:avLst/>
@@ -16347,11 +16582,10 @@
               <a:buChar char="•"/>
             </a:pPr>
             <a:r>
-              <a:rPr lang="en-US" sz="2400" dirty="0" smtClean="0">
-                <a:latin typeface="HelveticaNeueLT Com 45 Lt"/>
+              <a:rPr lang="en-US" dirty="0" smtClean="0">
                 <a:cs typeface="HelveticaNeueLT Com 45 Lt"/>
               </a:rPr>
-              <a:t>Used for obstacle detection</a:t>
+              <a:t>Using Laser scanner</a:t>
             </a:r>
           </a:p>
           <a:p>
@@ -16360,14 +16594,13 @@
               <a:buChar char="•"/>
             </a:pPr>
             <a:r>
-              <a:rPr lang="en-US" sz="2400" dirty="0">
+              <a:rPr lang="en-US" dirty="0">
                 <a:cs typeface="HelveticaNeueLT Com 45 Lt"/>
               </a:rPr>
               <a:t>C</a:t>
             </a:r>
             <a:r>
-              <a:rPr lang="en-US" sz="2400" dirty="0" smtClean="0">
-                <a:latin typeface="HelveticaNeueLT Com 45 Lt"/>
+              <a:rPr lang="en-US" dirty="0" smtClean="0">
                 <a:cs typeface="HelveticaNeueLT Com 45 Lt"/>
               </a:rPr>
               <a:t>urrently implemented with Java on Android OS</a:t>
@@ -16379,8 +16612,7 @@
               <a:buChar char="•"/>
             </a:pPr>
             <a:r>
-              <a:rPr lang="en-US" sz="2400" dirty="0" smtClean="0">
-                <a:latin typeface="HelveticaNeueLT Com 45 Lt"/>
+              <a:rPr lang="en-US" dirty="0" smtClean="0">
                 <a:cs typeface="HelveticaNeueLT Com 45 Lt"/>
               </a:rPr>
               <a:t>Computationally intensive evaluation of received data</a:t>
@@ -16392,61 +16624,18 @@
               <a:buChar char="•"/>
             </a:pPr>
             <a:r>
-              <a:rPr lang="en-US" sz="2000" dirty="0">
+              <a:rPr lang="en-US" dirty="0">
                 <a:cs typeface="HelveticaNeueLT Com 45 Lt"/>
               </a:rPr>
               <a:t>Data rate: ~34KB/</a:t>
             </a:r>
             <a:r>
-              <a:rPr lang="en-US" sz="2000" dirty="0" smtClean="0">
+              <a:rPr lang="en-US" dirty="0" smtClean="0">
                 <a:cs typeface="HelveticaNeueLT Com 45 Lt"/>
               </a:rPr>
               <a:t>s</a:t>
             </a:r>
-            <a:endParaRPr lang="en-US" sz="2000" dirty="0" smtClean="0">
-              <a:latin typeface="HelveticaNeueLT Com 45 Lt"/>
-              <a:cs typeface="HelveticaNeueLT Com 45 Lt"/>
-            </a:endParaRPr>
-          </a:p>
-          <a:p>
-            <a:pPr marL="457200" indent="-457200">
-              <a:buFont typeface="Arial"/>
-              <a:buChar char="•"/>
-            </a:pPr>
-            <a:endParaRPr lang="en-US" sz="2400" dirty="0" smtClean="0">
-              <a:latin typeface="HelveticaNeueLT Com 45 Lt"/>
-              <a:cs typeface="HelveticaNeueLT Com 45 Lt"/>
-            </a:endParaRPr>
-          </a:p>
-          <a:p>
-            <a:pPr marL="457200" indent="-457200">
-              <a:buFont typeface="Arial"/>
-              <a:buChar char="•"/>
-            </a:pPr>
-            <a:endParaRPr lang="en-US" sz="2400" dirty="0" smtClean="0">
-              <a:latin typeface="HelveticaNeueLT Com 45 Lt"/>
-              <a:cs typeface="HelveticaNeueLT Com 45 Lt"/>
-            </a:endParaRPr>
-          </a:p>
-          <a:p>
-            <a:pPr marL="457200" indent="-457200">
-              <a:buFont typeface="Arial"/>
-              <a:buChar char="•"/>
-            </a:pPr>
-            <a:endParaRPr lang="en-US" sz="2800" dirty="0" smtClean="0">
-              <a:latin typeface="HelveticaNeueLT Com 45 Lt"/>
-              <a:cs typeface="HelveticaNeueLT Com 45 Lt"/>
-            </a:endParaRPr>
-          </a:p>
-          <a:p>
-            <a:endParaRPr lang="en-US" sz="2800" dirty="0">
-              <a:latin typeface="HelveticaNeueLT Com 45 Lt"/>
-              <a:cs typeface="HelveticaNeueLT Com 45 Lt"/>
-            </a:endParaRPr>
-          </a:p>
-          <a:p>
-            <a:endParaRPr lang="en-US" sz="2800" dirty="0">
-              <a:latin typeface="HelveticaNeueLT Com 45 Lt"/>
+            <a:endParaRPr lang="en-US" dirty="0">
               <a:cs typeface="HelveticaNeueLT Com 45 Lt"/>
             </a:endParaRPr>
           </a:p>
@@ -16491,52 +16680,6 @@
       </p:grpSpPr>
       <p:sp>
         <p:nvSpPr>
-          <p:cNvPr id="2" name="Title 1"/>
-          <p:cNvSpPr>
-            <a:spLocks noGrp="1"/>
-          </p:cNvSpPr>
-          <p:nvPr>
-            <p:ph type="title"/>
-          </p:nvPr>
-        </p:nvSpPr>
-        <p:spPr/>
-        <p:txBody>
-          <a:bodyPr/>
-          <a:lstStyle/>
-          <a:p>
-            <a:r>
-              <a:rPr lang="en-US" dirty="0" smtClean="0"/>
-              <a:t>Pipeline Parallelism</a:t>
-            </a:r>
-            <a:endParaRPr lang="en-US" dirty="0"/>
-          </a:p>
-        </p:txBody>
-      </p:sp>
-      <p:sp>
-        <p:nvSpPr>
-          <p:cNvPr id="3" name="Content Placeholder 2"/>
-          <p:cNvSpPr>
-            <a:spLocks noGrp="1"/>
-          </p:cNvSpPr>
-          <p:nvPr>
-            <p:ph idx="1"/>
-          </p:nvPr>
-        </p:nvSpPr>
-        <p:spPr/>
-        <p:txBody>
-          <a:bodyPr/>
-          <a:lstStyle/>
-          <a:p>
-            <a:r>
-              <a:rPr lang="en-US" dirty="0" err="1" smtClean="0"/>
-              <a:t>asdasd</a:t>
-            </a:r>
-            <a:endParaRPr lang="en-US" dirty="0"/>
-          </a:p>
-        </p:txBody>
-      </p:sp>
-      <p:sp>
-        <p:nvSpPr>
           <p:cNvPr id="4" name="Slide Number Placeholder 3"/>
           <p:cNvSpPr>
             <a:spLocks noGrp="1"/>
@@ -16558,10 +16701,140 @@
           </a:p>
         </p:txBody>
       </p:sp>
+      <p:pic>
+        <p:nvPicPr>
+          <p:cNvPr id="12" name="Picture 11" descr="ZynqPlatformAnwendung.png"/>
+          <p:cNvPicPr>
+            <a:picLocks noChangeAspect="1"/>
+          </p:cNvPicPr>
+          <p:nvPr/>
+        </p:nvPicPr>
+        <p:blipFill>
+          <a:blip r:embed="rId2">
+            <a:alphaModFix amt="5000"/>
+            <a:extLst>
+              <a:ext uri="{28A0092B-C50C-407E-A947-70E740481C1C}">
+                <a14:useLocalDpi xmlns:a14="http://schemas.microsoft.com/office/drawing/2010/main" val="0"/>
+              </a:ext>
+            </a:extLst>
+          </a:blip>
+          <a:stretch>
+            <a:fillRect/>
+          </a:stretch>
+        </p:blipFill>
+        <p:spPr>
+          <a:xfrm>
+            <a:off x="226801" y="328866"/>
+            <a:ext cx="8666391" cy="5772174"/>
+          </a:xfrm>
+          <a:prstGeom prst="rect">
+            <a:avLst/>
+          </a:prstGeom>
+        </p:spPr>
+      </p:pic>
+      <p:pic>
+        <p:nvPicPr>
+          <p:cNvPr id="13" name="Picture 12" descr="ZynqPlatformAnwendung.png"/>
+          <p:cNvPicPr>
+            <a:picLocks noChangeAspect="1"/>
+          </p:cNvPicPr>
+          <p:nvPr/>
+        </p:nvPicPr>
+        <p:blipFill rotWithShape="1">
+          <a:blip r:embed="rId2">
+            <a:extLst>
+              <a:ext uri="{28A0092B-C50C-407E-A947-70E740481C1C}">
+                <a14:useLocalDpi xmlns:a14="http://schemas.microsoft.com/office/drawing/2010/main" val="0"/>
+              </a:ext>
+            </a:extLst>
+          </a:blip>
+          <a:srcRect l="20019" t="74678" r="-1"/>
+          <a:stretch/>
+        </p:blipFill>
+        <p:spPr>
+          <a:xfrm>
+            <a:off x="1961757" y="4638150"/>
+            <a:ext cx="6931434" cy="1461623"/>
+          </a:xfrm>
+          <a:prstGeom prst="rect">
+            <a:avLst/>
+          </a:prstGeom>
+        </p:spPr>
+      </p:pic>
+      <p:sp>
+        <p:nvSpPr>
+          <p:cNvPr id="8" name="Content Placeholder 7"/>
+          <p:cNvSpPr>
+            <a:spLocks noGrp="1"/>
+          </p:cNvSpPr>
+          <p:nvPr>
+            <p:ph idx="1"/>
+          </p:nvPr>
+        </p:nvSpPr>
+        <p:spPr>
+          <a:xfrm>
+            <a:off x="457200" y="1656901"/>
+            <a:ext cx="8229600" cy="2788466"/>
+          </a:xfrm>
+        </p:spPr>
+        <p:txBody>
+          <a:bodyPr/>
+          <a:lstStyle/>
+          <a:p>
+            <a:r>
+              <a:rPr lang="en-US" dirty="0" smtClean="0"/>
+              <a:t>Lane Guiding Control using high FPS camera (60 FPS, 752x40px)</a:t>
+            </a:r>
+          </a:p>
+          <a:p>
+            <a:r>
+              <a:rPr lang="en-US" dirty="0" smtClean="0"/>
+              <a:t>Implemented on Linux with C and FPGA modules</a:t>
+            </a:r>
+          </a:p>
+          <a:p>
+            <a:r>
+              <a:rPr lang="en-US" dirty="0" smtClean="0"/>
+              <a:t>Data rate: </a:t>
+            </a:r>
+            <a:r>
+              <a:rPr lang="en-US" dirty="0" smtClean="0"/>
+              <a:t>~20MB/s</a:t>
+            </a:r>
+            <a:endParaRPr lang="en-US" dirty="0" smtClean="0"/>
+          </a:p>
+          <a:p>
+            <a:endParaRPr lang="en-US" dirty="0"/>
+          </a:p>
+        </p:txBody>
+      </p:sp>
+      <p:sp>
+        <p:nvSpPr>
+          <p:cNvPr id="6" name="Title 5"/>
+          <p:cNvSpPr>
+            <a:spLocks noGrp="1"/>
+          </p:cNvSpPr>
+          <p:nvPr>
+            <p:ph type="title"/>
+          </p:nvPr>
+        </p:nvSpPr>
+        <p:spPr/>
+        <p:txBody>
+          <a:bodyPr/>
+          <a:lstStyle/>
+          <a:p>
+            <a:r>
+              <a:rPr lang="en-US" dirty="0" smtClean="0"/>
+              <a:t>Lane Guiding Control</a:t>
+            </a:r>
+            <a:endParaRPr lang="en-US" dirty="0"/>
+          </a:p>
+        </p:txBody>
+      </p:sp>
     </p:spTree>
     <p:extLst>
       <p:ext uri="{BB962C8B-B14F-4D97-AF65-F5344CB8AC3E}">
-        <p14:creationId xmlns:p14="http://schemas.microsoft.com/office/powerpoint/2010/main" val="2406343154"/>
+        <p14:creationId xmlns:p14="http://schemas.microsoft.com/office/powerpoint/2010/main" val="4107564436"/>
       </p:ext>
     </p:extLst>
   </p:cSld>
@@ -16597,27 +16870,22 @@
       </p:grpSpPr>
       <p:sp>
         <p:nvSpPr>
-          <p:cNvPr id="7" name="Title 6"/>
+          <p:cNvPr id="2" name="Title 1"/>
           <p:cNvSpPr>
             <a:spLocks noGrp="1"/>
           </p:cNvSpPr>
           <p:nvPr>
-            <p:ph type="ctrTitle"/>
+            <p:ph type="title"/>
           </p:nvPr>
         </p:nvSpPr>
-        <p:spPr>
-          <a:xfrm>
-            <a:off x="457200" y="2130425"/>
-            <a:ext cx="8229600" cy="1470025"/>
-          </a:xfrm>
-        </p:spPr>
+        <p:spPr/>
         <p:txBody>
           <a:bodyPr/>
           <a:lstStyle/>
           <a:p>
             <a:r>
               <a:rPr lang="en-US" dirty="0" smtClean="0"/>
-              <a:t>Single Instruction – Multiple Data</a:t>
+              <a:t>Pipeline Parallelism</a:t>
             </a:r>
             <a:endParaRPr lang="en-US" dirty="0"/>
           </a:p>
@@ -16625,27 +16893,22 @@
       </p:sp>
       <p:sp>
         <p:nvSpPr>
-          <p:cNvPr id="8" name="Subtitle 7"/>
+          <p:cNvPr id="3" name="Content Placeholder 2"/>
           <p:cNvSpPr>
             <a:spLocks noGrp="1"/>
           </p:cNvSpPr>
           <p:nvPr>
-            <p:ph type="subTitle" idx="1"/>
+            <p:ph idx="1"/>
           </p:nvPr>
         </p:nvSpPr>
-        <p:spPr>
-          <a:xfrm>
-            <a:off x="1371600" y="2724150"/>
-            <a:ext cx="6400800" cy="1752600"/>
-          </a:xfrm>
-        </p:spPr>
+        <p:spPr/>
         <p:txBody>
           <a:bodyPr/>
           <a:lstStyle/>
           <a:p>
             <a:r>
-              <a:rPr lang="en-US" dirty="0" smtClean="0"/>
-              <a:t>Using the ARM NEON engine</a:t>
+              <a:rPr lang="en-US" dirty="0" err="1" smtClean="0"/>
+              <a:t>asdasd</a:t>
             </a:r>
             <a:endParaRPr lang="en-US" dirty="0"/>
           </a:p>
@@ -16677,7 +16940,7 @@
     </p:spTree>
     <p:extLst>
       <p:ext uri="{BB962C8B-B14F-4D97-AF65-F5344CB8AC3E}">
-        <p14:creationId xmlns:p14="http://schemas.microsoft.com/office/powerpoint/2010/main" val="4194680713"/>
+        <p14:creationId xmlns:p14="http://schemas.microsoft.com/office/powerpoint/2010/main" val="2406343154"/>
       </p:ext>
     </p:extLst>
   </p:cSld>
@@ -16713,76 +16976,63 @@
       </p:grpSpPr>
       <p:sp>
         <p:nvSpPr>
-          <p:cNvPr id="2" name="Title 1"/>
+          <p:cNvPr id="7" name="Title 6"/>
           <p:cNvSpPr>
             <a:spLocks noGrp="1"/>
           </p:cNvSpPr>
           <p:nvPr>
-            <p:ph type="title"/>
+            <p:ph type="ctrTitle"/>
           </p:nvPr>
         </p:nvSpPr>
-        <p:spPr/>
+        <p:spPr>
+          <a:xfrm>
+            <a:off x="457200" y="2130425"/>
+            <a:ext cx="8229600" cy="1470025"/>
+          </a:xfrm>
+        </p:spPr>
         <p:txBody>
-          <a:bodyPr>
-            <a:normAutofit/>
-          </a:bodyPr>
+          <a:bodyPr/>
           <a:lstStyle/>
           <a:p>
             <a:r>
               <a:rPr lang="en-US" dirty="0" smtClean="0"/>
-              <a:t>Single Instruction - Multiple Data</a:t>
-            </a:r>
-            <a:endParaRPr lang="en-US" sz="2800" dirty="0"/>
+              <a:t>Single Instruction – Multiple Data</a:t>
+            </a:r>
+            <a:endParaRPr lang="en-US" dirty="0"/>
           </a:p>
         </p:txBody>
       </p:sp>
       <p:sp>
         <p:nvSpPr>
-          <p:cNvPr id="3" name="Content Placeholder 2"/>
+          <p:cNvPr id="8" name="Subtitle 7"/>
           <p:cNvSpPr>
             <a:spLocks noGrp="1"/>
           </p:cNvSpPr>
           <p:nvPr>
-            <p:ph idx="1"/>
+            <p:ph type="subTitle" idx="1"/>
           </p:nvPr>
         </p:nvSpPr>
         <p:spPr>
           <a:xfrm>
-            <a:off x="457200" y="1397551"/>
-            <a:ext cx="8229600" cy="1358484"/>
+            <a:off x="1371600" y="2724150"/>
+            <a:ext cx="6400800" cy="1752600"/>
           </a:xfrm>
         </p:spPr>
         <p:txBody>
-          <a:bodyPr>
-            <a:normAutofit fontScale="92500"/>
-          </a:bodyPr>
+          <a:bodyPr/>
           <a:lstStyle/>
           <a:p>
             <a:r>
               <a:rPr lang="en-US" dirty="0" smtClean="0"/>
-              <a:t>Exploits </a:t>
-            </a:r>
-            <a:r>
-              <a:rPr lang="en-US" dirty="0"/>
-              <a:t>d</a:t>
-            </a:r>
-            <a:r>
-              <a:rPr lang="en-US" dirty="0" smtClean="0"/>
-              <a:t>ata-level parallelism</a:t>
-            </a:r>
-          </a:p>
-          <a:p>
-            <a:pPr lvl="1"/>
-            <a:r>
-              <a:rPr lang="en-US" dirty="0" smtClean="0"/>
-              <a:t>Operations repeatedly applied to independent data</a:t>
-            </a:r>
+              <a:t>Using the ARM NEON engine</a:t>
+            </a:r>
+            <a:endParaRPr lang="en-US" dirty="0"/>
           </a:p>
         </p:txBody>
       </p:sp>
       <p:sp>
         <p:nvSpPr>
-          <p:cNvPr id="6" name="Slide Number Placeholder 5"/>
+          <p:cNvPr id="4" name="Slide Number Placeholder 3"/>
           <p:cNvSpPr>
             <a:spLocks noGrp="1"/>
           </p:cNvSpPr>
@@ -16806,7 +17056,7 @@
     </p:spTree>
     <p:extLst>
       <p:ext uri="{BB962C8B-B14F-4D97-AF65-F5344CB8AC3E}">
-        <p14:creationId xmlns:p14="http://schemas.microsoft.com/office/powerpoint/2010/main" val="1820839589"/>
+        <p14:creationId xmlns:p14="http://schemas.microsoft.com/office/powerpoint/2010/main" val="4194680713"/>
       </p:ext>
     </p:extLst>
   </p:cSld>
@@ -16842,48 +17092,6 @@
       </p:grpSpPr>
       <p:sp>
         <p:nvSpPr>
-          <p:cNvPr id="7" name="Right Arrow 6"/>
-          <p:cNvSpPr/>
-          <p:nvPr/>
-        </p:nvSpPr>
-        <p:spPr>
-          <a:xfrm>
-            <a:off x="3242793" y="4080012"/>
-            <a:ext cx="1718317" cy="851129"/>
-          </a:xfrm>
-          <a:prstGeom prst="rightArrow">
-            <a:avLst/>
-          </a:prstGeom>
-        </p:spPr>
-        <p:style>
-          <a:lnRef idx="2">
-            <a:schemeClr val="dk1">
-              <a:shade val="50000"/>
-            </a:schemeClr>
-          </a:lnRef>
-          <a:fillRef idx="1">
-            <a:schemeClr val="dk1"/>
-          </a:fillRef>
-          <a:effectRef idx="0">
-            <a:schemeClr val="dk1"/>
-          </a:effectRef>
-          <a:fontRef idx="minor">
-            <a:schemeClr val="lt1"/>
-          </a:fontRef>
-        </p:style>
-        <p:txBody>
-          <a:bodyPr rtlCol="0" anchor="ctr"/>
-          <a:lstStyle/>
-          <a:p>
-            <a:pPr algn="ctr"/>
-            <a:endParaRPr lang="en-US" dirty="0">
-              <a:latin typeface="HelveticaNeueLT Com 45 Lt"/>
-            </a:endParaRPr>
-          </a:p>
-        </p:txBody>
-      </p:sp>
-      <p:sp>
-        <p:nvSpPr>
           <p:cNvPr id="2" name="Title 1"/>
           <p:cNvSpPr>
             <a:spLocks noGrp="1"/>
@@ -16974,70 +17182,10 @@
           </a:p>
         </p:txBody>
       </p:sp>
-      <p:pic>
-        <p:nvPicPr>
-          <p:cNvPr id="4" name="Picture 3" descr="cat.jpg"/>
-          <p:cNvPicPr>
-            <a:picLocks noChangeAspect="1"/>
-          </p:cNvPicPr>
-          <p:nvPr/>
-        </p:nvPicPr>
-        <p:blipFill>
-          <a:blip r:embed="rId2">
-            <a:extLst>
-              <a:ext uri="{28A0092B-C50C-407E-A947-70E740481C1C}">
-                <a14:useLocalDpi xmlns:a14="http://schemas.microsoft.com/office/drawing/2010/main" val="0"/>
-              </a:ext>
-            </a:extLst>
-          </a:blip>
-          <a:stretch>
-            <a:fillRect/>
-          </a:stretch>
-        </p:blipFill>
-        <p:spPr>
-          <a:xfrm>
-            <a:off x="349109" y="3131587"/>
-            <a:ext cx="3804440" cy="2853330"/>
-          </a:xfrm>
-          <a:prstGeom prst="rect">
-            <a:avLst/>
-          </a:prstGeom>
-        </p:spPr>
-      </p:pic>
-      <p:pic>
-        <p:nvPicPr>
-          <p:cNvPr id="5" name="Picture 4" descr="cat-grey.jpg"/>
-          <p:cNvPicPr>
-            <a:picLocks noChangeAspect="1"/>
-          </p:cNvPicPr>
-          <p:nvPr/>
-        </p:nvPicPr>
-        <p:blipFill>
-          <a:blip r:embed="rId3">
-            <a:extLst>
-              <a:ext uri="{28A0092B-C50C-407E-A947-70E740481C1C}">
-                <a14:useLocalDpi xmlns:a14="http://schemas.microsoft.com/office/drawing/2010/main" val="0"/>
-              </a:ext>
-            </a:extLst>
-          </a:blip>
-          <a:stretch>
-            <a:fillRect/>
-          </a:stretch>
-        </p:blipFill>
-        <p:spPr>
-          <a:xfrm>
-            <a:off x="4972282" y="3131586"/>
-            <a:ext cx="3804441" cy="2853331"/>
-          </a:xfrm>
-          <a:prstGeom prst="rect">
-            <a:avLst/>
-          </a:prstGeom>
-        </p:spPr>
-      </p:pic>
     </p:spTree>
     <p:extLst>
       <p:ext uri="{BB962C8B-B14F-4D97-AF65-F5344CB8AC3E}">
-        <p14:creationId xmlns:p14="http://schemas.microsoft.com/office/powerpoint/2010/main" val="661692733"/>
+        <p14:creationId xmlns:p14="http://schemas.microsoft.com/office/powerpoint/2010/main" val="1820839589"/>
       </p:ext>
     </p:extLst>
   </p:cSld>

</xml_diff>

<commit_message>
Snapshot fohl und schwarz feedback email
</commit_message>
<xml_diff>
--- a/Praese/Presentation1.pptx
+++ b/Praese/Presentation1.pptx
@@ -16147,7 +16147,11 @@
           <a:bodyPr/>
           <a:lstStyle/>
           <a:p>
-            <a:endParaRPr lang="en-US"/>
+            <a:r>
+              <a:rPr lang="en-US" dirty="0" smtClean="0"/>
+              <a:t>TODO</a:t>
+            </a:r>
+            <a:endParaRPr lang="en-US" dirty="0"/>
           </a:p>
         </p:txBody>
       </p:sp>
@@ -16368,7 +16372,11 @@
           <a:bodyPr/>
           <a:lstStyle/>
           <a:p>
-            <a:endParaRPr lang="en-US"/>
+            <a:r>
+              <a:rPr lang="en-US" dirty="0" smtClean="0"/>
+              <a:t>TODO</a:t>
+            </a:r>
+            <a:endParaRPr lang="en-US" dirty="0"/>
           </a:p>
         </p:txBody>
       </p:sp>
@@ -16465,7 +16473,12 @@
             <p:ph type="subTitle" idx="1"/>
           </p:nvPr>
         </p:nvSpPr>
-        <p:spPr/>
+        <p:spPr>
+          <a:xfrm>
+            <a:off x="1371600" y="2468700"/>
+            <a:ext cx="6400800" cy="1752600"/>
+          </a:xfrm>
+        </p:spPr>
         <p:txBody>
           <a:bodyPr/>
           <a:lstStyle/>
@@ -17453,8 +17466,8 @@
           <a:lstStyle/>
           <a:p>
             <a:r>
-              <a:rPr lang="en-US" dirty="0" err="1" smtClean="0"/>
-              <a:t>asdasd</a:t>
+              <a:rPr lang="en-US" dirty="0" smtClean="0"/>
+              <a:t>TODO</a:t>
             </a:r>
             <a:endParaRPr lang="en-US" dirty="0"/>
           </a:p>

</xml_diff>